<commit_message>
added remaining chapters to slides
</commit_message>
<xml_diff>
--- a/Slides.pptx
+++ b/Slides.pptx
@@ -5,7 +5,7 @@
     <p:sldMasterId id="2147483670" r:id="rId1"/>
   </p:sldMasterIdLst>
   <p:notesMasterIdLst>
-    <p:notesMasterId r:id="rId21"/>
+    <p:notesMasterId r:id="rId31"/>
   </p:notesMasterIdLst>
   <p:sldIdLst>
     <p:sldId id="263" r:id="rId2"/>
@@ -27,23 +27,33 @@
     <p:sldId id="277" r:id="rId18"/>
     <p:sldId id="281" r:id="rId19"/>
     <p:sldId id="264" r:id="rId20"/>
+    <p:sldId id="282" r:id="rId21"/>
+    <p:sldId id="283" r:id="rId22"/>
+    <p:sldId id="284" r:id="rId23"/>
+    <p:sldId id="285" r:id="rId24"/>
+    <p:sldId id="286" r:id="rId25"/>
+    <p:sldId id="287" r:id="rId26"/>
+    <p:sldId id="288" r:id="rId27"/>
+    <p:sldId id="289" r:id="rId28"/>
+    <p:sldId id="290" r:id="rId29"/>
+    <p:sldId id="291" r:id="rId30"/>
   </p:sldIdLst>
   <p:sldSz cx="9144000" cy="5143500" type="screen16x9"/>
   <p:notesSz cx="6858000" cy="9144000"/>
   <p:embeddedFontLst>
     <p:embeddedFont>
       <p:font typeface="Calibri" panose="020F0502020204030204" pitchFamily="34" charset="0"/>
-      <p:regular r:id="rId22"/>
-      <p:bold r:id="rId23"/>
-      <p:italic r:id="rId24"/>
-      <p:boldItalic r:id="rId25"/>
+      <p:regular r:id="rId32"/>
+      <p:bold r:id="rId33"/>
+      <p:italic r:id="rId34"/>
+      <p:boldItalic r:id="rId35"/>
     </p:embeddedFont>
     <p:embeddedFont>
       <p:font typeface="Montserrat" pitchFamily="2" charset="77"/>
-      <p:regular r:id="rId26"/>
-      <p:bold r:id="rId27"/>
-      <p:italic r:id="rId28"/>
-      <p:boldItalic r:id="rId29"/>
+      <p:regular r:id="rId36"/>
+      <p:bold r:id="rId37"/>
+      <p:italic r:id="rId38"/>
+      <p:boldItalic r:id="rId39"/>
     </p:embeddedFont>
   </p:embeddedFontLst>
   <p:defaultTextStyle>
@@ -281,6 +291,10 @@
         <p14:section name="Default Section" id="{809586F8-FE74-4143-BF8F-F9FE856454C2}">
           <p14:sldIdLst>
             <p14:sldId id="263"/>
+          </p14:sldIdLst>
+        </p14:section>
+        <p14:section name="Chapter 1" id="{244B457A-80E3-E94B-BBAE-D6ADA51EF264}">
+          <p14:sldIdLst>
             <p14:sldId id="280"/>
             <p14:sldId id="262"/>
             <p14:sldId id="265"/>
@@ -299,6 +313,36 @@
             <p14:sldId id="277"/>
             <p14:sldId id="281"/>
             <p14:sldId id="264"/>
+          </p14:sldIdLst>
+        </p14:section>
+        <p14:section name="Chapter 2" id="{E97DDF63-1697-884F-BB00-723281DCDEBF}">
+          <p14:sldIdLst>
+            <p14:sldId id="282"/>
+            <p14:sldId id="283"/>
+          </p14:sldIdLst>
+        </p14:section>
+        <p14:section name="Chapter 3" id="{52689198-E475-6B44-9A56-D9592AFB836A}">
+          <p14:sldIdLst>
+            <p14:sldId id="284"/>
+            <p14:sldId id="285"/>
+          </p14:sldIdLst>
+        </p14:section>
+        <p14:section name="Chapter 4" id="{34C94E90-130D-764F-A21B-DB99A673A762}">
+          <p14:sldIdLst>
+            <p14:sldId id="286"/>
+            <p14:sldId id="287"/>
+          </p14:sldIdLst>
+        </p14:section>
+        <p14:section name="Chapter 5" id="{EE262F47-52B2-0743-8ED3-EA0D0631E83D}">
+          <p14:sldIdLst>
+            <p14:sldId id="288"/>
+            <p14:sldId id="289"/>
+          </p14:sldIdLst>
+        </p14:section>
+        <p14:section name="Chapter 6" id="{B6459EA9-C213-5345-81CD-AC96C0C2163D}">
+          <p14:sldIdLst>
+            <p14:sldId id="290"/>
+            <p14:sldId id="291"/>
           </p14:sldIdLst>
         </p14:section>
       </p14:sectionLst>
@@ -1498,6 +1542,465 @@
 </p:notes>
 </file>
 
+<file path=ppt/notesSlides/notesSlide17.xml><?xml version="1.0" encoding="utf-8"?>
+<p:notes xmlns:a="http://schemas.openxmlformats.org/drawingml/2006/main" xmlns:r="http://schemas.openxmlformats.org/officeDocument/2006/relationships" xmlns:p="http://schemas.openxmlformats.org/presentationml/2006/main" showMasterSp="0" showMasterPhAnim="0">
+  <p:cSld>
+    <p:spTree>
+      <p:nvGrpSpPr>
+        <p:cNvPr id="1" name="Shape 95"/>
+        <p:cNvGrpSpPr/>
+        <p:nvPr/>
+      </p:nvGrpSpPr>
+      <p:grpSpPr>
+        <a:xfrm>
+          <a:off x="0" y="0"/>
+          <a:ext cx="0" cy="0"/>
+          <a:chOff x="0" y="0"/>
+          <a:chExt cx="0" cy="0"/>
+        </a:xfrm>
+      </p:grpSpPr>
+      <p:sp>
+        <p:nvSpPr>
+          <p:cNvPr id="96" name="Google Shape;96;g167c3300ff1_0_278:notes"/>
+          <p:cNvSpPr txBox="1">
+            <a:spLocks noGrp="1"/>
+          </p:cNvSpPr>
+          <p:nvPr>
+            <p:ph type="body" idx="1"/>
+          </p:nvPr>
+        </p:nvSpPr>
+        <p:spPr>
+          <a:xfrm>
+            <a:off x="685800" y="4343400"/>
+            <a:ext cx="5486400" cy="4114800"/>
+          </a:xfrm>
+          <a:prstGeom prst="rect">
+            <a:avLst/>
+          </a:prstGeom>
+          <a:noFill/>
+          <a:ln>
+            <a:noFill/>
+          </a:ln>
+        </p:spPr>
+        <p:txBody>
+          <a:bodyPr spcFirstLastPara="1" wrap="square" lIns="91425" tIns="91425" rIns="91425" bIns="91425" anchor="t" anchorCtr="0">
+            <a:noAutofit/>
+          </a:bodyPr>
+          <a:lstStyle/>
+          <a:p>
+            <a:pPr marL="0" lvl="0" indent="0" algn="l" rtl="0">
+              <a:lnSpc>
+                <a:spcPct val="100000"/>
+              </a:lnSpc>
+              <a:spcBef>
+                <a:spcPts val="0"/>
+              </a:spcBef>
+              <a:spcAft>
+                <a:spcPts val="0"/>
+              </a:spcAft>
+              <a:buSzPts val="1100"/>
+              <a:buNone/>
+            </a:pPr>
+            <a:endParaRPr sz="1200">
+              <a:latin typeface="Calibri"/>
+              <a:ea typeface="Calibri"/>
+              <a:cs typeface="Calibri"/>
+              <a:sym typeface="Calibri"/>
+            </a:endParaRPr>
+          </a:p>
+          <a:p>
+            <a:pPr marL="0" lvl="0" indent="0" algn="l" rtl="0">
+              <a:lnSpc>
+                <a:spcPct val="100000"/>
+              </a:lnSpc>
+              <a:spcBef>
+                <a:spcPts val="0"/>
+              </a:spcBef>
+              <a:spcAft>
+                <a:spcPts val="0"/>
+              </a:spcAft>
+              <a:buSzPts val="1100"/>
+              <a:buNone/>
+            </a:pPr>
+            <a:endParaRPr sz="1200">
+              <a:latin typeface="Calibri"/>
+              <a:ea typeface="Calibri"/>
+              <a:cs typeface="Calibri"/>
+              <a:sym typeface="Calibri"/>
+            </a:endParaRPr>
+          </a:p>
+        </p:txBody>
+      </p:sp>
+      <p:sp>
+        <p:nvSpPr>
+          <p:cNvPr id="97" name="Google Shape;97;g167c3300ff1_0_278:notes"/>
+          <p:cNvSpPr>
+            <a:spLocks noGrp="1" noRot="1" noChangeAspect="1"/>
+          </p:cNvSpPr>
+          <p:nvPr>
+            <p:ph type="sldImg" idx="2"/>
+          </p:nvPr>
+        </p:nvSpPr>
+        <p:spPr>
+          <a:xfrm>
+            <a:off x="381000" y="685800"/>
+            <a:ext cx="6096000" cy="3429000"/>
+          </a:xfrm>
+          <a:custGeom>
+            <a:avLst/>
+            <a:gdLst/>
+            <a:ahLst/>
+            <a:cxnLst/>
+            <a:rect l="l" t="t" r="r" b="b"/>
+            <a:pathLst>
+              <a:path w="120000" h="120000" extrusionOk="0">
+                <a:moveTo>
+                  <a:pt x="0" y="0"/>
+                </a:moveTo>
+                <a:lnTo>
+                  <a:pt x="120000" y="0"/>
+                </a:lnTo>
+                <a:lnTo>
+                  <a:pt x="120000" y="120000"/>
+                </a:lnTo>
+                <a:lnTo>
+                  <a:pt x="0" y="120000"/>
+                </a:lnTo>
+                <a:close/>
+              </a:path>
+            </a:pathLst>
+          </a:custGeom>
+          <a:noFill/>
+          <a:ln w="9525" cap="flat" cmpd="sng">
+            <a:solidFill>
+              <a:srgbClr val="000000"/>
+            </a:solidFill>
+            <a:prstDash val="solid"/>
+            <a:round/>
+            <a:headEnd type="none" w="sm" len="sm"/>
+            <a:tailEnd type="none" w="sm" len="sm"/>
+          </a:ln>
+        </p:spPr>
+      </p:sp>
+    </p:spTree>
+    <p:extLst>
+      <p:ext uri="{BB962C8B-B14F-4D97-AF65-F5344CB8AC3E}">
+        <p14:creationId xmlns:p14="http://schemas.microsoft.com/office/powerpoint/2010/main" val="2184939557"/>
+      </p:ext>
+    </p:extLst>
+  </p:cSld>
+  <p:clrMapOvr>
+    <a:masterClrMapping/>
+  </p:clrMapOvr>
+</p:notes>
+</file>
+
+<file path=ppt/notesSlides/notesSlide18.xml><?xml version="1.0" encoding="utf-8"?>
+<p:notes xmlns:a="http://schemas.openxmlformats.org/drawingml/2006/main" xmlns:r="http://schemas.openxmlformats.org/officeDocument/2006/relationships" xmlns:p="http://schemas.openxmlformats.org/presentationml/2006/main" showMasterSp="0" showMasterPhAnim="0">
+  <p:cSld>
+    <p:spTree>
+      <p:nvGrpSpPr>
+        <p:cNvPr id="1" name="Shape 95"/>
+        <p:cNvGrpSpPr/>
+        <p:nvPr/>
+      </p:nvGrpSpPr>
+      <p:grpSpPr>
+        <a:xfrm>
+          <a:off x="0" y="0"/>
+          <a:ext cx="0" cy="0"/>
+          <a:chOff x="0" y="0"/>
+          <a:chExt cx="0" cy="0"/>
+        </a:xfrm>
+      </p:grpSpPr>
+      <p:sp>
+        <p:nvSpPr>
+          <p:cNvPr id="96" name="Google Shape;96;g167c3300ff1_0_278:notes"/>
+          <p:cNvSpPr txBox="1">
+            <a:spLocks noGrp="1"/>
+          </p:cNvSpPr>
+          <p:nvPr>
+            <p:ph type="body" idx="1"/>
+          </p:nvPr>
+        </p:nvSpPr>
+        <p:spPr>
+          <a:xfrm>
+            <a:off x="685800" y="4343400"/>
+            <a:ext cx="5486400" cy="4114800"/>
+          </a:xfrm>
+          <a:prstGeom prst="rect">
+            <a:avLst/>
+          </a:prstGeom>
+          <a:noFill/>
+          <a:ln>
+            <a:noFill/>
+          </a:ln>
+        </p:spPr>
+        <p:txBody>
+          <a:bodyPr spcFirstLastPara="1" wrap="square" lIns="91425" tIns="91425" rIns="91425" bIns="91425" anchor="t" anchorCtr="0">
+            <a:noAutofit/>
+          </a:bodyPr>
+          <a:lstStyle/>
+          <a:p>
+            <a:pPr marL="0" lvl="0" indent="0" algn="l" rtl="0">
+              <a:lnSpc>
+                <a:spcPct val="100000"/>
+              </a:lnSpc>
+              <a:spcBef>
+                <a:spcPts val="0"/>
+              </a:spcBef>
+              <a:spcAft>
+                <a:spcPts val="0"/>
+              </a:spcAft>
+              <a:buSzPts val="1100"/>
+              <a:buNone/>
+            </a:pPr>
+            <a:endParaRPr sz="1200">
+              <a:latin typeface="Calibri"/>
+              <a:ea typeface="Calibri"/>
+              <a:cs typeface="Calibri"/>
+              <a:sym typeface="Calibri"/>
+            </a:endParaRPr>
+          </a:p>
+          <a:p>
+            <a:pPr marL="0" lvl="0" indent="0" algn="l" rtl="0">
+              <a:lnSpc>
+                <a:spcPct val="100000"/>
+              </a:lnSpc>
+              <a:spcBef>
+                <a:spcPts val="0"/>
+              </a:spcBef>
+              <a:spcAft>
+                <a:spcPts val="0"/>
+              </a:spcAft>
+              <a:buSzPts val="1100"/>
+              <a:buNone/>
+            </a:pPr>
+            <a:endParaRPr sz="1200">
+              <a:latin typeface="Calibri"/>
+              <a:ea typeface="Calibri"/>
+              <a:cs typeface="Calibri"/>
+              <a:sym typeface="Calibri"/>
+            </a:endParaRPr>
+          </a:p>
+        </p:txBody>
+      </p:sp>
+      <p:sp>
+        <p:nvSpPr>
+          <p:cNvPr id="97" name="Google Shape;97;g167c3300ff1_0_278:notes"/>
+          <p:cNvSpPr>
+            <a:spLocks noGrp="1" noRot="1" noChangeAspect="1"/>
+          </p:cNvSpPr>
+          <p:nvPr>
+            <p:ph type="sldImg" idx="2"/>
+          </p:nvPr>
+        </p:nvSpPr>
+        <p:spPr>
+          <a:xfrm>
+            <a:off x="381000" y="685800"/>
+            <a:ext cx="6096000" cy="3429000"/>
+          </a:xfrm>
+          <a:custGeom>
+            <a:avLst/>
+            <a:gdLst/>
+            <a:ahLst/>
+            <a:cxnLst/>
+            <a:rect l="l" t="t" r="r" b="b"/>
+            <a:pathLst>
+              <a:path w="120000" h="120000" extrusionOk="0">
+                <a:moveTo>
+                  <a:pt x="0" y="0"/>
+                </a:moveTo>
+                <a:lnTo>
+                  <a:pt x="120000" y="0"/>
+                </a:lnTo>
+                <a:lnTo>
+                  <a:pt x="120000" y="120000"/>
+                </a:lnTo>
+                <a:lnTo>
+                  <a:pt x="0" y="120000"/>
+                </a:lnTo>
+                <a:close/>
+              </a:path>
+            </a:pathLst>
+          </a:custGeom>
+          <a:noFill/>
+          <a:ln w="9525" cap="flat" cmpd="sng">
+            <a:solidFill>
+              <a:srgbClr val="000000"/>
+            </a:solidFill>
+            <a:prstDash val="solid"/>
+            <a:round/>
+            <a:headEnd type="none" w="sm" len="sm"/>
+            <a:tailEnd type="none" w="sm" len="sm"/>
+          </a:ln>
+        </p:spPr>
+      </p:sp>
+    </p:spTree>
+    <p:extLst>
+      <p:ext uri="{BB962C8B-B14F-4D97-AF65-F5344CB8AC3E}">
+        <p14:creationId xmlns:p14="http://schemas.microsoft.com/office/powerpoint/2010/main" val="2640281628"/>
+      </p:ext>
+    </p:extLst>
+  </p:cSld>
+  <p:clrMapOvr>
+    <a:masterClrMapping/>
+  </p:clrMapOvr>
+</p:notes>
+</file>
+
+<file path=ppt/notesSlides/notesSlide19.xml><?xml version="1.0" encoding="utf-8"?>
+<p:notes xmlns:a="http://schemas.openxmlformats.org/drawingml/2006/main" xmlns:r="http://schemas.openxmlformats.org/officeDocument/2006/relationships" xmlns:p="http://schemas.openxmlformats.org/presentationml/2006/main" showMasterSp="0" showMasterPhAnim="0">
+  <p:cSld>
+    <p:spTree>
+      <p:nvGrpSpPr>
+        <p:cNvPr id="1" name="Shape 95"/>
+        <p:cNvGrpSpPr/>
+        <p:nvPr/>
+      </p:nvGrpSpPr>
+      <p:grpSpPr>
+        <a:xfrm>
+          <a:off x="0" y="0"/>
+          <a:ext cx="0" cy="0"/>
+          <a:chOff x="0" y="0"/>
+          <a:chExt cx="0" cy="0"/>
+        </a:xfrm>
+      </p:grpSpPr>
+      <p:sp>
+        <p:nvSpPr>
+          <p:cNvPr id="96" name="Google Shape;96;g167c3300ff1_0_278:notes"/>
+          <p:cNvSpPr txBox="1">
+            <a:spLocks noGrp="1"/>
+          </p:cNvSpPr>
+          <p:nvPr>
+            <p:ph type="body" idx="1"/>
+          </p:nvPr>
+        </p:nvSpPr>
+        <p:spPr>
+          <a:xfrm>
+            <a:off x="685800" y="4343400"/>
+            <a:ext cx="5486400" cy="4114800"/>
+          </a:xfrm>
+          <a:prstGeom prst="rect">
+            <a:avLst/>
+          </a:prstGeom>
+          <a:noFill/>
+          <a:ln>
+            <a:noFill/>
+          </a:ln>
+        </p:spPr>
+        <p:txBody>
+          <a:bodyPr spcFirstLastPara="1" wrap="square" lIns="91425" tIns="91425" rIns="91425" bIns="91425" anchor="t" anchorCtr="0">
+            <a:noAutofit/>
+          </a:bodyPr>
+          <a:lstStyle/>
+          <a:p>
+            <a:pPr marL="0" lvl="0" indent="0" algn="l" rtl="0">
+              <a:lnSpc>
+                <a:spcPct val="100000"/>
+              </a:lnSpc>
+              <a:spcBef>
+                <a:spcPts val="0"/>
+              </a:spcBef>
+              <a:spcAft>
+                <a:spcPts val="0"/>
+              </a:spcAft>
+              <a:buSzPts val="1100"/>
+              <a:buNone/>
+            </a:pPr>
+            <a:endParaRPr sz="1200">
+              <a:latin typeface="Calibri"/>
+              <a:ea typeface="Calibri"/>
+              <a:cs typeface="Calibri"/>
+              <a:sym typeface="Calibri"/>
+            </a:endParaRPr>
+          </a:p>
+          <a:p>
+            <a:pPr marL="0" lvl="0" indent="0" algn="l" rtl="0">
+              <a:lnSpc>
+                <a:spcPct val="100000"/>
+              </a:lnSpc>
+              <a:spcBef>
+                <a:spcPts val="0"/>
+              </a:spcBef>
+              <a:spcAft>
+                <a:spcPts val="0"/>
+              </a:spcAft>
+              <a:buSzPts val="1100"/>
+              <a:buNone/>
+            </a:pPr>
+            <a:endParaRPr sz="1200">
+              <a:latin typeface="Calibri"/>
+              <a:ea typeface="Calibri"/>
+              <a:cs typeface="Calibri"/>
+              <a:sym typeface="Calibri"/>
+            </a:endParaRPr>
+          </a:p>
+        </p:txBody>
+      </p:sp>
+      <p:sp>
+        <p:nvSpPr>
+          <p:cNvPr id="97" name="Google Shape;97;g167c3300ff1_0_278:notes"/>
+          <p:cNvSpPr>
+            <a:spLocks noGrp="1" noRot="1" noChangeAspect="1"/>
+          </p:cNvSpPr>
+          <p:nvPr>
+            <p:ph type="sldImg" idx="2"/>
+          </p:nvPr>
+        </p:nvSpPr>
+        <p:spPr>
+          <a:xfrm>
+            <a:off x="381000" y="685800"/>
+            <a:ext cx="6096000" cy="3429000"/>
+          </a:xfrm>
+          <a:custGeom>
+            <a:avLst/>
+            <a:gdLst/>
+            <a:ahLst/>
+            <a:cxnLst/>
+            <a:rect l="l" t="t" r="r" b="b"/>
+            <a:pathLst>
+              <a:path w="120000" h="120000" extrusionOk="0">
+                <a:moveTo>
+                  <a:pt x="0" y="0"/>
+                </a:moveTo>
+                <a:lnTo>
+                  <a:pt x="120000" y="0"/>
+                </a:lnTo>
+                <a:lnTo>
+                  <a:pt x="120000" y="120000"/>
+                </a:lnTo>
+                <a:lnTo>
+                  <a:pt x="0" y="120000"/>
+                </a:lnTo>
+                <a:close/>
+              </a:path>
+            </a:pathLst>
+          </a:custGeom>
+          <a:noFill/>
+          <a:ln w="9525" cap="flat" cmpd="sng">
+            <a:solidFill>
+              <a:srgbClr val="000000"/>
+            </a:solidFill>
+            <a:prstDash val="solid"/>
+            <a:round/>
+            <a:headEnd type="none" w="sm" len="sm"/>
+            <a:tailEnd type="none" w="sm" len="sm"/>
+          </a:ln>
+        </p:spPr>
+      </p:sp>
+    </p:spTree>
+    <p:extLst>
+      <p:ext uri="{BB962C8B-B14F-4D97-AF65-F5344CB8AC3E}">
+        <p14:creationId xmlns:p14="http://schemas.microsoft.com/office/powerpoint/2010/main" val="560370557"/>
+      </p:ext>
+    </p:extLst>
+  </p:cSld>
+  <p:clrMapOvr>
+    <a:masterClrMapping/>
+  </p:clrMapOvr>
+</p:notes>
+</file>
+
 <file path=ppt/notesSlides/notesSlide2.xml><?xml version="1.0" encoding="utf-8"?>
 <p:notes xmlns:a="http://schemas.openxmlformats.org/drawingml/2006/main" xmlns:r="http://schemas.openxmlformats.org/officeDocument/2006/relationships" xmlns:p="http://schemas.openxmlformats.org/presentationml/2006/main" showMasterSp="0" showMasterPhAnim="0">
   <p:cSld>
@@ -1642,6 +2145,1077 @@
     <p:extLst>
       <p:ext uri="{BB962C8B-B14F-4D97-AF65-F5344CB8AC3E}">
         <p14:creationId xmlns:p14="http://schemas.microsoft.com/office/powerpoint/2010/main" val="1473535714"/>
+      </p:ext>
+    </p:extLst>
+  </p:cSld>
+  <p:clrMapOvr>
+    <a:masterClrMapping/>
+  </p:clrMapOvr>
+</p:notes>
+</file>
+
+<file path=ppt/notesSlides/notesSlide20.xml><?xml version="1.0" encoding="utf-8"?>
+<p:notes xmlns:a="http://schemas.openxmlformats.org/drawingml/2006/main" xmlns:r="http://schemas.openxmlformats.org/officeDocument/2006/relationships" xmlns:p="http://schemas.openxmlformats.org/presentationml/2006/main" showMasterSp="0" showMasterPhAnim="0">
+  <p:cSld>
+    <p:spTree>
+      <p:nvGrpSpPr>
+        <p:cNvPr id="1" name="Shape 95"/>
+        <p:cNvGrpSpPr/>
+        <p:nvPr/>
+      </p:nvGrpSpPr>
+      <p:grpSpPr>
+        <a:xfrm>
+          <a:off x="0" y="0"/>
+          <a:ext cx="0" cy="0"/>
+          <a:chOff x="0" y="0"/>
+          <a:chExt cx="0" cy="0"/>
+        </a:xfrm>
+      </p:grpSpPr>
+      <p:sp>
+        <p:nvSpPr>
+          <p:cNvPr id="96" name="Google Shape;96;g167c3300ff1_0_278:notes"/>
+          <p:cNvSpPr txBox="1">
+            <a:spLocks noGrp="1"/>
+          </p:cNvSpPr>
+          <p:nvPr>
+            <p:ph type="body" idx="1"/>
+          </p:nvPr>
+        </p:nvSpPr>
+        <p:spPr>
+          <a:xfrm>
+            <a:off x="685800" y="4343400"/>
+            <a:ext cx="5486400" cy="4114800"/>
+          </a:xfrm>
+          <a:prstGeom prst="rect">
+            <a:avLst/>
+          </a:prstGeom>
+          <a:noFill/>
+          <a:ln>
+            <a:noFill/>
+          </a:ln>
+        </p:spPr>
+        <p:txBody>
+          <a:bodyPr spcFirstLastPara="1" wrap="square" lIns="91425" tIns="91425" rIns="91425" bIns="91425" anchor="t" anchorCtr="0">
+            <a:noAutofit/>
+          </a:bodyPr>
+          <a:lstStyle/>
+          <a:p>
+            <a:pPr marL="0" lvl="0" indent="0" algn="l" rtl="0">
+              <a:lnSpc>
+                <a:spcPct val="100000"/>
+              </a:lnSpc>
+              <a:spcBef>
+                <a:spcPts val="0"/>
+              </a:spcBef>
+              <a:spcAft>
+                <a:spcPts val="0"/>
+              </a:spcAft>
+              <a:buSzPts val="1100"/>
+              <a:buNone/>
+            </a:pPr>
+            <a:endParaRPr sz="1200">
+              <a:latin typeface="Calibri"/>
+              <a:ea typeface="Calibri"/>
+              <a:cs typeface="Calibri"/>
+              <a:sym typeface="Calibri"/>
+            </a:endParaRPr>
+          </a:p>
+          <a:p>
+            <a:pPr marL="0" lvl="0" indent="0" algn="l" rtl="0">
+              <a:lnSpc>
+                <a:spcPct val="100000"/>
+              </a:lnSpc>
+              <a:spcBef>
+                <a:spcPts val="0"/>
+              </a:spcBef>
+              <a:spcAft>
+                <a:spcPts val="0"/>
+              </a:spcAft>
+              <a:buSzPts val="1100"/>
+              <a:buNone/>
+            </a:pPr>
+            <a:endParaRPr sz="1200">
+              <a:latin typeface="Calibri"/>
+              <a:ea typeface="Calibri"/>
+              <a:cs typeface="Calibri"/>
+              <a:sym typeface="Calibri"/>
+            </a:endParaRPr>
+          </a:p>
+        </p:txBody>
+      </p:sp>
+      <p:sp>
+        <p:nvSpPr>
+          <p:cNvPr id="97" name="Google Shape;97;g167c3300ff1_0_278:notes"/>
+          <p:cNvSpPr>
+            <a:spLocks noGrp="1" noRot="1" noChangeAspect="1"/>
+          </p:cNvSpPr>
+          <p:nvPr>
+            <p:ph type="sldImg" idx="2"/>
+          </p:nvPr>
+        </p:nvSpPr>
+        <p:spPr>
+          <a:xfrm>
+            <a:off x="381000" y="685800"/>
+            <a:ext cx="6096000" cy="3429000"/>
+          </a:xfrm>
+          <a:custGeom>
+            <a:avLst/>
+            <a:gdLst/>
+            <a:ahLst/>
+            <a:cxnLst/>
+            <a:rect l="l" t="t" r="r" b="b"/>
+            <a:pathLst>
+              <a:path w="120000" h="120000" extrusionOk="0">
+                <a:moveTo>
+                  <a:pt x="0" y="0"/>
+                </a:moveTo>
+                <a:lnTo>
+                  <a:pt x="120000" y="0"/>
+                </a:lnTo>
+                <a:lnTo>
+                  <a:pt x="120000" y="120000"/>
+                </a:lnTo>
+                <a:lnTo>
+                  <a:pt x="0" y="120000"/>
+                </a:lnTo>
+                <a:close/>
+              </a:path>
+            </a:pathLst>
+          </a:custGeom>
+          <a:noFill/>
+          <a:ln w="9525" cap="flat" cmpd="sng">
+            <a:solidFill>
+              <a:srgbClr val="000000"/>
+            </a:solidFill>
+            <a:prstDash val="solid"/>
+            <a:round/>
+            <a:headEnd type="none" w="sm" len="sm"/>
+            <a:tailEnd type="none" w="sm" len="sm"/>
+          </a:ln>
+        </p:spPr>
+      </p:sp>
+    </p:spTree>
+    <p:extLst>
+      <p:ext uri="{BB962C8B-B14F-4D97-AF65-F5344CB8AC3E}">
+        <p14:creationId xmlns:p14="http://schemas.microsoft.com/office/powerpoint/2010/main" val="2416962961"/>
+      </p:ext>
+    </p:extLst>
+  </p:cSld>
+  <p:clrMapOvr>
+    <a:masterClrMapping/>
+  </p:clrMapOvr>
+</p:notes>
+</file>
+
+<file path=ppt/notesSlides/notesSlide21.xml><?xml version="1.0" encoding="utf-8"?>
+<p:notes xmlns:a="http://schemas.openxmlformats.org/drawingml/2006/main" xmlns:r="http://schemas.openxmlformats.org/officeDocument/2006/relationships" xmlns:p="http://schemas.openxmlformats.org/presentationml/2006/main" showMasterSp="0" showMasterPhAnim="0">
+  <p:cSld>
+    <p:spTree>
+      <p:nvGrpSpPr>
+        <p:cNvPr id="1" name="Shape 95"/>
+        <p:cNvGrpSpPr/>
+        <p:nvPr/>
+      </p:nvGrpSpPr>
+      <p:grpSpPr>
+        <a:xfrm>
+          <a:off x="0" y="0"/>
+          <a:ext cx="0" cy="0"/>
+          <a:chOff x="0" y="0"/>
+          <a:chExt cx="0" cy="0"/>
+        </a:xfrm>
+      </p:grpSpPr>
+      <p:sp>
+        <p:nvSpPr>
+          <p:cNvPr id="96" name="Google Shape;96;g167c3300ff1_0_278:notes"/>
+          <p:cNvSpPr txBox="1">
+            <a:spLocks noGrp="1"/>
+          </p:cNvSpPr>
+          <p:nvPr>
+            <p:ph type="body" idx="1"/>
+          </p:nvPr>
+        </p:nvSpPr>
+        <p:spPr>
+          <a:xfrm>
+            <a:off x="685800" y="4343400"/>
+            <a:ext cx="5486400" cy="4114800"/>
+          </a:xfrm>
+          <a:prstGeom prst="rect">
+            <a:avLst/>
+          </a:prstGeom>
+          <a:noFill/>
+          <a:ln>
+            <a:noFill/>
+          </a:ln>
+        </p:spPr>
+        <p:txBody>
+          <a:bodyPr spcFirstLastPara="1" wrap="square" lIns="91425" tIns="91425" rIns="91425" bIns="91425" anchor="t" anchorCtr="0">
+            <a:noAutofit/>
+          </a:bodyPr>
+          <a:lstStyle/>
+          <a:p>
+            <a:pPr marL="0" lvl="0" indent="0" algn="l" rtl="0">
+              <a:lnSpc>
+                <a:spcPct val="100000"/>
+              </a:lnSpc>
+              <a:spcBef>
+                <a:spcPts val="0"/>
+              </a:spcBef>
+              <a:spcAft>
+                <a:spcPts val="0"/>
+              </a:spcAft>
+              <a:buSzPts val="1100"/>
+              <a:buNone/>
+            </a:pPr>
+            <a:endParaRPr sz="1200">
+              <a:latin typeface="Calibri"/>
+              <a:ea typeface="Calibri"/>
+              <a:cs typeface="Calibri"/>
+              <a:sym typeface="Calibri"/>
+            </a:endParaRPr>
+          </a:p>
+          <a:p>
+            <a:pPr marL="0" lvl="0" indent="0" algn="l" rtl="0">
+              <a:lnSpc>
+                <a:spcPct val="100000"/>
+              </a:lnSpc>
+              <a:spcBef>
+                <a:spcPts val="0"/>
+              </a:spcBef>
+              <a:spcAft>
+                <a:spcPts val="0"/>
+              </a:spcAft>
+              <a:buSzPts val="1100"/>
+              <a:buNone/>
+            </a:pPr>
+            <a:endParaRPr sz="1200">
+              <a:latin typeface="Calibri"/>
+              <a:ea typeface="Calibri"/>
+              <a:cs typeface="Calibri"/>
+              <a:sym typeface="Calibri"/>
+            </a:endParaRPr>
+          </a:p>
+        </p:txBody>
+      </p:sp>
+      <p:sp>
+        <p:nvSpPr>
+          <p:cNvPr id="97" name="Google Shape;97;g167c3300ff1_0_278:notes"/>
+          <p:cNvSpPr>
+            <a:spLocks noGrp="1" noRot="1" noChangeAspect="1"/>
+          </p:cNvSpPr>
+          <p:nvPr>
+            <p:ph type="sldImg" idx="2"/>
+          </p:nvPr>
+        </p:nvSpPr>
+        <p:spPr>
+          <a:xfrm>
+            <a:off x="381000" y="685800"/>
+            <a:ext cx="6096000" cy="3429000"/>
+          </a:xfrm>
+          <a:custGeom>
+            <a:avLst/>
+            <a:gdLst/>
+            <a:ahLst/>
+            <a:cxnLst/>
+            <a:rect l="l" t="t" r="r" b="b"/>
+            <a:pathLst>
+              <a:path w="120000" h="120000" extrusionOk="0">
+                <a:moveTo>
+                  <a:pt x="0" y="0"/>
+                </a:moveTo>
+                <a:lnTo>
+                  <a:pt x="120000" y="0"/>
+                </a:lnTo>
+                <a:lnTo>
+                  <a:pt x="120000" y="120000"/>
+                </a:lnTo>
+                <a:lnTo>
+                  <a:pt x="0" y="120000"/>
+                </a:lnTo>
+                <a:close/>
+              </a:path>
+            </a:pathLst>
+          </a:custGeom>
+          <a:noFill/>
+          <a:ln w="9525" cap="flat" cmpd="sng">
+            <a:solidFill>
+              <a:srgbClr val="000000"/>
+            </a:solidFill>
+            <a:prstDash val="solid"/>
+            <a:round/>
+            <a:headEnd type="none" w="sm" len="sm"/>
+            <a:tailEnd type="none" w="sm" len="sm"/>
+          </a:ln>
+        </p:spPr>
+      </p:sp>
+    </p:spTree>
+    <p:extLst>
+      <p:ext uri="{BB962C8B-B14F-4D97-AF65-F5344CB8AC3E}">
+        <p14:creationId xmlns:p14="http://schemas.microsoft.com/office/powerpoint/2010/main" val="4245995400"/>
+      </p:ext>
+    </p:extLst>
+  </p:cSld>
+  <p:clrMapOvr>
+    <a:masterClrMapping/>
+  </p:clrMapOvr>
+</p:notes>
+</file>
+
+<file path=ppt/notesSlides/notesSlide22.xml><?xml version="1.0" encoding="utf-8"?>
+<p:notes xmlns:a="http://schemas.openxmlformats.org/drawingml/2006/main" xmlns:r="http://schemas.openxmlformats.org/officeDocument/2006/relationships" xmlns:p="http://schemas.openxmlformats.org/presentationml/2006/main" showMasterSp="0" showMasterPhAnim="0">
+  <p:cSld>
+    <p:spTree>
+      <p:nvGrpSpPr>
+        <p:cNvPr id="1" name="Shape 95"/>
+        <p:cNvGrpSpPr/>
+        <p:nvPr/>
+      </p:nvGrpSpPr>
+      <p:grpSpPr>
+        <a:xfrm>
+          <a:off x="0" y="0"/>
+          <a:ext cx="0" cy="0"/>
+          <a:chOff x="0" y="0"/>
+          <a:chExt cx="0" cy="0"/>
+        </a:xfrm>
+      </p:grpSpPr>
+      <p:sp>
+        <p:nvSpPr>
+          <p:cNvPr id="96" name="Google Shape;96;g167c3300ff1_0_278:notes"/>
+          <p:cNvSpPr txBox="1">
+            <a:spLocks noGrp="1"/>
+          </p:cNvSpPr>
+          <p:nvPr>
+            <p:ph type="body" idx="1"/>
+          </p:nvPr>
+        </p:nvSpPr>
+        <p:spPr>
+          <a:xfrm>
+            <a:off x="685800" y="4343400"/>
+            <a:ext cx="5486400" cy="4114800"/>
+          </a:xfrm>
+          <a:prstGeom prst="rect">
+            <a:avLst/>
+          </a:prstGeom>
+          <a:noFill/>
+          <a:ln>
+            <a:noFill/>
+          </a:ln>
+        </p:spPr>
+        <p:txBody>
+          <a:bodyPr spcFirstLastPara="1" wrap="square" lIns="91425" tIns="91425" rIns="91425" bIns="91425" anchor="t" anchorCtr="0">
+            <a:noAutofit/>
+          </a:bodyPr>
+          <a:lstStyle/>
+          <a:p>
+            <a:pPr marL="0" lvl="0" indent="0" algn="l" rtl="0">
+              <a:lnSpc>
+                <a:spcPct val="100000"/>
+              </a:lnSpc>
+              <a:spcBef>
+                <a:spcPts val="0"/>
+              </a:spcBef>
+              <a:spcAft>
+                <a:spcPts val="0"/>
+              </a:spcAft>
+              <a:buSzPts val="1100"/>
+              <a:buNone/>
+            </a:pPr>
+            <a:endParaRPr sz="1200">
+              <a:latin typeface="Calibri"/>
+              <a:ea typeface="Calibri"/>
+              <a:cs typeface="Calibri"/>
+              <a:sym typeface="Calibri"/>
+            </a:endParaRPr>
+          </a:p>
+          <a:p>
+            <a:pPr marL="0" lvl="0" indent="0" algn="l" rtl="0">
+              <a:lnSpc>
+                <a:spcPct val="100000"/>
+              </a:lnSpc>
+              <a:spcBef>
+                <a:spcPts val="0"/>
+              </a:spcBef>
+              <a:spcAft>
+                <a:spcPts val="0"/>
+              </a:spcAft>
+              <a:buSzPts val="1100"/>
+              <a:buNone/>
+            </a:pPr>
+            <a:endParaRPr sz="1200">
+              <a:latin typeface="Calibri"/>
+              <a:ea typeface="Calibri"/>
+              <a:cs typeface="Calibri"/>
+              <a:sym typeface="Calibri"/>
+            </a:endParaRPr>
+          </a:p>
+        </p:txBody>
+      </p:sp>
+      <p:sp>
+        <p:nvSpPr>
+          <p:cNvPr id="97" name="Google Shape;97;g167c3300ff1_0_278:notes"/>
+          <p:cNvSpPr>
+            <a:spLocks noGrp="1" noRot="1" noChangeAspect="1"/>
+          </p:cNvSpPr>
+          <p:nvPr>
+            <p:ph type="sldImg" idx="2"/>
+          </p:nvPr>
+        </p:nvSpPr>
+        <p:spPr>
+          <a:xfrm>
+            <a:off x="381000" y="685800"/>
+            <a:ext cx="6096000" cy="3429000"/>
+          </a:xfrm>
+          <a:custGeom>
+            <a:avLst/>
+            <a:gdLst/>
+            <a:ahLst/>
+            <a:cxnLst/>
+            <a:rect l="l" t="t" r="r" b="b"/>
+            <a:pathLst>
+              <a:path w="120000" h="120000" extrusionOk="0">
+                <a:moveTo>
+                  <a:pt x="0" y="0"/>
+                </a:moveTo>
+                <a:lnTo>
+                  <a:pt x="120000" y="0"/>
+                </a:lnTo>
+                <a:lnTo>
+                  <a:pt x="120000" y="120000"/>
+                </a:lnTo>
+                <a:lnTo>
+                  <a:pt x="0" y="120000"/>
+                </a:lnTo>
+                <a:close/>
+              </a:path>
+            </a:pathLst>
+          </a:custGeom>
+          <a:noFill/>
+          <a:ln w="9525" cap="flat" cmpd="sng">
+            <a:solidFill>
+              <a:srgbClr val="000000"/>
+            </a:solidFill>
+            <a:prstDash val="solid"/>
+            <a:round/>
+            <a:headEnd type="none" w="sm" len="sm"/>
+            <a:tailEnd type="none" w="sm" len="sm"/>
+          </a:ln>
+        </p:spPr>
+      </p:sp>
+    </p:spTree>
+    <p:extLst>
+      <p:ext uri="{BB962C8B-B14F-4D97-AF65-F5344CB8AC3E}">
+        <p14:creationId xmlns:p14="http://schemas.microsoft.com/office/powerpoint/2010/main" val="3450877122"/>
+      </p:ext>
+    </p:extLst>
+  </p:cSld>
+  <p:clrMapOvr>
+    <a:masterClrMapping/>
+  </p:clrMapOvr>
+</p:notes>
+</file>
+
+<file path=ppt/notesSlides/notesSlide23.xml><?xml version="1.0" encoding="utf-8"?>
+<p:notes xmlns:a="http://schemas.openxmlformats.org/drawingml/2006/main" xmlns:r="http://schemas.openxmlformats.org/officeDocument/2006/relationships" xmlns:p="http://schemas.openxmlformats.org/presentationml/2006/main" showMasterSp="0" showMasterPhAnim="0">
+  <p:cSld>
+    <p:spTree>
+      <p:nvGrpSpPr>
+        <p:cNvPr id="1" name="Shape 95"/>
+        <p:cNvGrpSpPr/>
+        <p:nvPr/>
+      </p:nvGrpSpPr>
+      <p:grpSpPr>
+        <a:xfrm>
+          <a:off x="0" y="0"/>
+          <a:ext cx="0" cy="0"/>
+          <a:chOff x="0" y="0"/>
+          <a:chExt cx="0" cy="0"/>
+        </a:xfrm>
+      </p:grpSpPr>
+      <p:sp>
+        <p:nvSpPr>
+          <p:cNvPr id="96" name="Google Shape;96;g167c3300ff1_0_278:notes"/>
+          <p:cNvSpPr txBox="1">
+            <a:spLocks noGrp="1"/>
+          </p:cNvSpPr>
+          <p:nvPr>
+            <p:ph type="body" idx="1"/>
+          </p:nvPr>
+        </p:nvSpPr>
+        <p:spPr>
+          <a:xfrm>
+            <a:off x="685800" y="4343400"/>
+            <a:ext cx="5486400" cy="4114800"/>
+          </a:xfrm>
+          <a:prstGeom prst="rect">
+            <a:avLst/>
+          </a:prstGeom>
+          <a:noFill/>
+          <a:ln>
+            <a:noFill/>
+          </a:ln>
+        </p:spPr>
+        <p:txBody>
+          <a:bodyPr spcFirstLastPara="1" wrap="square" lIns="91425" tIns="91425" rIns="91425" bIns="91425" anchor="t" anchorCtr="0">
+            <a:noAutofit/>
+          </a:bodyPr>
+          <a:lstStyle/>
+          <a:p>
+            <a:pPr marL="0" lvl="0" indent="0" algn="l" rtl="0">
+              <a:lnSpc>
+                <a:spcPct val="100000"/>
+              </a:lnSpc>
+              <a:spcBef>
+                <a:spcPts val="0"/>
+              </a:spcBef>
+              <a:spcAft>
+                <a:spcPts val="0"/>
+              </a:spcAft>
+              <a:buSzPts val="1100"/>
+              <a:buNone/>
+            </a:pPr>
+            <a:endParaRPr sz="1200">
+              <a:latin typeface="Calibri"/>
+              <a:ea typeface="Calibri"/>
+              <a:cs typeface="Calibri"/>
+              <a:sym typeface="Calibri"/>
+            </a:endParaRPr>
+          </a:p>
+          <a:p>
+            <a:pPr marL="0" lvl="0" indent="0" algn="l" rtl="0">
+              <a:lnSpc>
+                <a:spcPct val="100000"/>
+              </a:lnSpc>
+              <a:spcBef>
+                <a:spcPts val="0"/>
+              </a:spcBef>
+              <a:spcAft>
+                <a:spcPts val="0"/>
+              </a:spcAft>
+              <a:buSzPts val="1100"/>
+              <a:buNone/>
+            </a:pPr>
+            <a:endParaRPr sz="1200">
+              <a:latin typeface="Calibri"/>
+              <a:ea typeface="Calibri"/>
+              <a:cs typeface="Calibri"/>
+              <a:sym typeface="Calibri"/>
+            </a:endParaRPr>
+          </a:p>
+        </p:txBody>
+      </p:sp>
+      <p:sp>
+        <p:nvSpPr>
+          <p:cNvPr id="97" name="Google Shape;97;g167c3300ff1_0_278:notes"/>
+          <p:cNvSpPr>
+            <a:spLocks noGrp="1" noRot="1" noChangeAspect="1"/>
+          </p:cNvSpPr>
+          <p:nvPr>
+            <p:ph type="sldImg" idx="2"/>
+          </p:nvPr>
+        </p:nvSpPr>
+        <p:spPr>
+          <a:xfrm>
+            <a:off x="381000" y="685800"/>
+            <a:ext cx="6096000" cy="3429000"/>
+          </a:xfrm>
+          <a:custGeom>
+            <a:avLst/>
+            <a:gdLst/>
+            <a:ahLst/>
+            <a:cxnLst/>
+            <a:rect l="l" t="t" r="r" b="b"/>
+            <a:pathLst>
+              <a:path w="120000" h="120000" extrusionOk="0">
+                <a:moveTo>
+                  <a:pt x="0" y="0"/>
+                </a:moveTo>
+                <a:lnTo>
+                  <a:pt x="120000" y="0"/>
+                </a:lnTo>
+                <a:lnTo>
+                  <a:pt x="120000" y="120000"/>
+                </a:lnTo>
+                <a:lnTo>
+                  <a:pt x="0" y="120000"/>
+                </a:lnTo>
+                <a:close/>
+              </a:path>
+            </a:pathLst>
+          </a:custGeom>
+          <a:noFill/>
+          <a:ln w="9525" cap="flat" cmpd="sng">
+            <a:solidFill>
+              <a:srgbClr val="000000"/>
+            </a:solidFill>
+            <a:prstDash val="solid"/>
+            <a:round/>
+            <a:headEnd type="none" w="sm" len="sm"/>
+            <a:tailEnd type="none" w="sm" len="sm"/>
+          </a:ln>
+        </p:spPr>
+      </p:sp>
+    </p:spTree>
+    <p:extLst>
+      <p:ext uri="{BB962C8B-B14F-4D97-AF65-F5344CB8AC3E}">
+        <p14:creationId xmlns:p14="http://schemas.microsoft.com/office/powerpoint/2010/main" val="3657821374"/>
+      </p:ext>
+    </p:extLst>
+  </p:cSld>
+  <p:clrMapOvr>
+    <a:masterClrMapping/>
+  </p:clrMapOvr>
+</p:notes>
+</file>
+
+<file path=ppt/notesSlides/notesSlide24.xml><?xml version="1.0" encoding="utf-8"?>
+<p:notes xmlns:a="http://schemas.openxmlformats.org/drawingml/2006/main" xmlns:r="http://schemas.openxmlformats.org/officeDocument/2006/relationships" xmlns:p="http://schemas.openxmlformats.org/presentationml/2006/main" showMasterSp="0" showMasterPhAnim="0">
+  <p:cSld>
+    <p:spTree>
+      <p:nvGrpSpPr>
+        <p:cNvPr id="1" name="Shape 95"/>
+        <p:cNvGrpSpPr/>
+        <p:nvPr/>
+      </p:nvGrpSpPr>
+      <p:grpSpPr>
+        <a:xfrm>
+          <a:off x="0" y="0"/>
+          <a:ext cx="0" cy="0"/>
+          <a:chOff x="0" y="0"/>
+          <a:chExt cx="0" cy="0"/>
+        </a:xfrm>
+      </p:grpSpPr>
+      <p:sp>
+        <p:nvSpPr>
+          <p:cNvPr id="96" name="Google Shape;96;g167c3300ff1_0_278:notes"/>
+          <p:cNvSpPr txBox="1">
+            <a:spLocks noGrp="1"/>
+          </p:cNvSpPr>
+          <p:nvPr>
+            <p:ph type="body" idx="1"/>
+          </p:nvPr>
+        </p:nvSpPr>
+        <p:spPr>
+          <a:xfrm>
+            <a:off x="685800" y="4343400"/>
+            <a:ext cx="5486400" cy="4114800"/>
+          </a:xfrm>
+          <a:prstGeom prst="rect">
+            <a:avLst/>
+          </a:prstGeom>
+          <a:noFill/>
+          <a:ln>
+            <a:noFill/>
+          </a:ln>
+        </p:spPr>
+        <p:txBody>
+          <a:bodyPr spcFirstLastPara="1" wrap="square" lIns="91425" tIns="91425" rIns="91425" bIns="91425" anchor="t" anchorCtr="0">
+            <a:noAutofit/>
+          </a:bodyPr>
+          <a:lstStyle/>
+          <a:p>
+            <a:pPr marL="0" lvl="0" indent="0" algn="l" rtl="0">
+              <a:lnSpc>
+                <a:spcPct val="100000"/>
+              </a:lnSpc>
+              <a:spcBef>
+                <a:spcPts val="0"/>
+              </a:spcBef>
+              <a:spcAft>
+                <a:spcPts val="0"/>
+              </a:spcAft>
+              <a:buSzPts val="1100"/>
+              <a:buNone/>
+            </a:pPr>
+            <a:endParaRPr sz="1200">
+              <a:latin typeface="Calibri"/>
+              <a:ea typeface="Calibri"/>
+              <a:cs typeface="Calibri"/>
+              <a:sym typeface="Calibri"/>
+            </a:endParaRPr>
+          </a:p>
+          <a:p>
+            <a:pPr marL="0" lvl="0" indent="0" algn="l" rtl="0">
+              <a:lnSpc>
+                <a:spcPct val="100000"/>
+              </a:lnSpc>
+              <a:spcBef>
+                <a:spcPts val="0"/>
+              </a:spcBef>
+              <a:spcAft>
+                <a:spcPts val="0"/>
+              </a:spcAft>
+              <a:buSzPts val="1100"/>
+              <a:buNone/>
+            </a:pPr>
+            <a:endParaRPr sz="1200">
+              <a:latin typeface="Calibri"/>
+              <a:ea typeface="Calibri"/>
+              <a:cs typeface="Calibri"/>
+              <a:sym typeface="Calibri"/>
+            </a:endParaRPr>
+          </a:p>
+        </p:txBody>
+      </p:sp>
+      <p:sp>
+        <p:nvSpPr>
+          <p:cNvPr id="97" name="Google Shape;97;g167c3300ff1_0_278:notes"/>
+          <p:cNvSpPr>
+            <a:spLocks noGrp="1" noRot="1" noChangeAspect="1"/>
+          </p:cNvSpPr>
+          <p:nvPr>
+            <p:ph type="sldImg" idx="2"/>
+          </p:nvPr>
+        </p:nvSpPr>
+        <p:spPr>
+          <a:xfrm>
+            <a:off x="381000" y="685800"/>
+            <a:ext cx="6096000" cy="3429000"/>
+          </a:xfrm>
+          <a:custGeom>
+            <a:avLst/>
+            <a:gdLst/>
+            <a:ahLst/>
+            <a:cxnLst/>
+            <a:rect l="l" t="t" r="r" b="b"/>
+            <a:pathLst>
+              <a:path w="120000" h="120000" extrusionOk="0">
+                <a:moveTo>
+                  <a:pt x="0" y="0"/>
+                </a:moveTo>
+                <a:lnTo>
+                  <a:pt x="120000" y="0"/>
+                </a:lnTo>
+                <a:lnTo>
+                  <a:pt x="120000" y="120000"/>
+                </a:lnTo>
+                <a:lnTo>
+                  <a:pt x="0" y="120000"/>
+                </a:lnTo>
+                <a:close/>
+              </a:path>
+            </a:pathLst>
+          </a:custGeom>
+          <a:noFill/>
+          <a:ln w="9525" cap="flat" cmpd="sng">
+            <a:solidFill>
+              <a:srgbClr val="000000"/>
+            </a:solidFill>
+            <a:prstDash val="solid"/>
+            <a:round/>
+            <a:headEnd type="none" w="sm" len="sm"/>
+            <a:tailEnd type="none" w="sm" len="sm"/>
+          </a:ln>
+        </p:spPr>
+      </p:sp>
+    </p:spTree>
+    <p:extLst>
+      <p:ext uri="{BB962C8B-B14F-4D97-AF65-F5344CB8AC3E}">
+        <p14:creationId xmlns:p14="http://schemas.microsoft.com/office/powerpoint/2010/main" val="1395393117"/>
+      </p:ext>
+    </p:extLst>
+  </p:cSld>
+  <p:clrMapOvr>
+    <a:masterClrMapping/>
+  </p:clrMapOvr>
+</p:notes>
+</file>
+
+<file path=ppt/notesSlides/notesSlide25.xml><?xml version="1.0" encoding="utf-8"?>
+<p:notes xmlns:a="http://schemas.openxmlformats.org/drawingml/2006/main" xmlns:r="http://schemas.openxmlformats.org/officeDocument/2006/relationships" xmlns:p="http://schemas.openxmlformats.org/presentationml/2006/main" showMasterSp="0" showMasterPhAnim="0">
+  <p:cSld>
+    <p:spTree>
+      <p:nvGrpSpPr>
+        <p:cNvPr id="1" name="Shape 95"/>
+        <p:cNvGrpSpPr/>
+        <p:nvPr/>
+      </p:nvGrpSpPr>
+      <p:grpSpPr>
+        <a:xfrm>
+          <a:off x="0" y="0"/>
+          <a:ext cx="0" cy="0"/>
+          <a:chOff x="0" y="0"/>
+          <a:chExt cx="0" cy="0"/>
+        </a:xfrm>
+      </p:grpSpPr>
+      <p:sp>
+        <p:nvSpPr>
+          <p:cNvPr id="96" name="Google Shape;96;g167c3300ff1_0_278:notes"/>
+          <p:cNvSpPr txBox="1">
+            <a:spLocks noGrp="1"/>
+          </p:cNvSpPr>
+          <p:nvPr>
+            <p:ph type="body" idx="1"/>
+          </p:nvPr>
+        </p:nvSpPr>
+        <p:spPr>
+          <a:xfrm>
+            <a:off x="685800" y="4343400"/>
+            <a:ext cx="5486400" cy="4114800"/>
+          </a:xfrm>
+          <a:prstGeom prst="rect">
+            <a:avLst/>
+          </a:prstGeom>
+          <a:noFill/>
+          <a:ln>
+            <a:noFill/>
+          </a:ln>
+        </p:spPr>
+        <p:txBody>
+          <a:bodyPr spcFirstLastPara="1" wrap="square" lIns="91425" tIns="91425" rIns="91425" bIns="91425" anchor="t" anchorCtr="0">
+            <a:noAutofit/>
+          </a:bodyPr>
+          <a:lstStyle/>
+          <a:p>
+            <a:pPr marL="0" lvl="0" indent="0" algn="l" rtl="0">
+              <a:lnSpc>
+                <a:spcPct val="100000"/>
+              </a:lnSpc>
+              <a:spcBef>
+                <a:spcPts val="0"/>
+              </a:spcBef>
+              <a:spcAft>
+                <a:spcPts val="0"/>
+              </a:spcAft>
+              <a:buSzPts val="1100"/>
+              <a:buNone/>
+            </a:pPr>
+            <a:endParaRPr sz="1200">
+              <a:latin typeface="Calibri"/>
+              <a:ea typeface="Calibri"/>
+              <a:cs typeface="Calibri"/>
+              <a:sym typeface="Calibri"/>
+            </a:endParaRPr>
+          </a:p>
+          <a:p>
+            <a:pPr marL="0" lvl="0" indent="0" algn="l" rtl="0">
+              <a:lnSpc>
+                <a:spcPct val="100000"/>
+              </a:lnSpc>
+              <a:spcBef>
+                <a:spcPts val="0"/>
+              </a:spcBef>
+              <a:spcAft>
+                <a:spcPts val="0"/>
+              </a:spcAft>
+              <a:buSzPts val="1100"/>
+              <a:buNone/>
+            </a:pPr>
+            <a:endParaRPr sz="1200">
+              <a:latin typeface="Calibri"/>
+              <a:ea typeface="Calibri"/>
+              <a:cs typeface="Calibri"/>
+              <a:sym typeface="Calibri"/>
+            </a:endParaRPr>
+          </a:p>
+        </p:txBody>
+      </p:sp>
+      <p:sp>
+        <p:nvSpPr>
+          <p:cNvPr id="97" name="Google Shape;97;g167c3300ff1_0_278:notes"/>
+          <p:cNvSpPr>
+            <a:spLocks noGrp="1" noRot="1" noChangeAspect="1"/>
+          </p:cNvSpPr>
+          <p:nvPr>
+            <p:ph type="sldImg" idx="2"/>
+          </p:nvPr>
+        </p:nvSpPr>
+        <p:spPr>
+          <a:xfrm>
+            <a:off x="381000" y="685800"/>
+            <a:ext cx="6096000" cy="3429000"/>
+          </a:xfrm>
+          <a:custGeom>
+            <a:avLst/>
+            <a:gdLst/>
+            <a:ahLst/>
+            <a:cxnLst/>
+            <a:rect l="l" t="t" r="r" b="b"/>
+            <a:pathLst>
+              <a:path w="120000" h="120000" extrusionOk="0">
+                <a:moveTo>
+                  <a:pt x="0" y="0"/>
+                </a:moveTo>
+                <a:lnTo>
+                  <a:pt x="120000" y="0"/>
+                </a:lnTo>
+                <a:lnTo>
+                  <a:pt x="120000" y="120000"/>
+                </a:lnTo>
+                <a:lnTo>
+                  <a:pt x="0" y="120000"/>
+                </a:lnTo>
+                <a:close/>
+              </a:path>
+            </a:pathLst>
+          </a:custGeom>
+          <a:noFill/>
+          <a:ln w="9525" cap="flat" cmpd="sng">
+            <a:solidFill>
+              <a:srgbClr val="000000"/>
+            </a:solidFill>
+            <a:prstDash val="solid"/>
+            <a:round/>
+            <a:headEnd type="none" w="sm" len="sm"/>
+            <a:tailEnd type="none" w="sm" len="sm"/>
+          </a:ln>
+        </p:spPr>
+      </p:sp>
+    </p:spTree>
+    <p:extLst>
+      <p:ext uri="{BB962C8B-B14F-4D97-AF65-F5344CB8AC3E}">
+        <p14:creationId xmlns:p14="http://schemas.microsoft.com/office/powerpoint/2010/main" val="4137436687"/>
+      </p:ext>
+    </p:extLst>
+  </p:cSld>
+  <p:clrMapOvr>
+    <a:masterClrMapping/>
+  </p:clrMapOvr>
+</p:notes>
+</file>
+
+<file path=ppt/notesSlides/notesSlide26.xml><?xml version="1.0" encoding="utf-8"?>
+<p:notes xmlns:a="http://schemas.openxmlformats.org/drawingml/2006/main" xmlns:r="http://schemas.openxmlformats.org/officeDocument/2006/relationships" xmlns:p="http://schemas.openxmlformats.org/presentationml/2006/main" showMasterSp="0" showMasterPhAnim="0">
+  <p:cSld>
+    <p:spTree>
+      <p:nvGrpSpPr>
+        <p:cNvPr id="1" name="Shape 95"/>
+        <p:cNvGrpSpPr/>
+        <p:nvPr/>
+      </p:nvGrpSpPr>
+      <p:grpSpPr>
+        <a:xfrm>
+          <a:off x="0" y="0"/>
+          <a:ext cx="0" cy="0"/>
+          <a:chOff x="0" y="0"/>
+          <a:chExt cx="0" cy="0"/>
+        </a:xfrm>
+      </p:grpSpPr>
+      <p:sp>
+        <p:nvSpPr>
+          <p:cNvPr id="96" name="Google Shape;96;g167c3300ff1_0_278:notes"/>
+          <p:cNvSpPr txBox="1">
+            <a:spLocks noGrp="1"/>
+          </p:cNvSpPr>
+          <p:nvPr>
+            <p:ph type="body" idx="1"/>
+          </p:nvPr>
+        </p:nvSpPr>
+        <p:spPr>
+          <a:xfrm>
+            <a:off x="685800" y="4343400"/>
+            <a:ext cx="5486400" cy="4114800"/>
+          </a:xfrm>
+          <a:prstGeom prst="rect">
+            <a:avLst/>
+          </a:prstGeom>
+          <a:noFill/>
+          <a:ln>
+            <a:noFill/>
+          </a:ln>
+        </p:spPr>
+        <p:txBody>
+          <a:bodyPr spcFirstLastPara="1" wrap="square" lIns="91425" tIns="91425" rIns="91425" bIns="91425" anchor="t" anchorCtr="0">
+            <a:noAutofit/>
+          </a:bodyPr>
+          <a:lstStyle/>
+          <a:p>
+            <a:pPr marL="0" lvl="0" indent="0" algn="l" rtl="0">
+              <a:lnSpc>
+                <a:spcPct val="100000"/>
+              </a:lnSpc>
+              <a:spcBef>
+                <a:spcPts val="0"/>
+              </a:spcBef>
+              <a:spcAft>
+                <a:spcPts val="0"/>
+              </a:spcAft>
+              <a:buSzPts val="1100"/>
+              <a:buNone/>
+            </a:pPr>
+            <a:endParaRPr sz="1200">
+              <a:latin typeface="Calibri"/>
+              <a:ea typeface="Calibri"/>
+              <a:cs typeface="Calibri"/>
+              <a:sym typeface="Calibri"/>
+            </a:endParaRPr>
+          </a:p>
+          <a:p>
+            <a:pPr marL="0" lvl="0" indent="0" algn="l" rtl="0">
+              <a:lnSpc>
+                <a:spcPct val="100000"/>
+              </a:lnSpc>
+              <a:spcBef>
+                <a:spcPts val="0"/>
+              </a:spcBef>
+              <a:spcAft>
+                <a:spcPts val="0"/>
+              </a:spcAft>
+              <a:buSzPts val="1100"/>
+              <a:buNone/>
+            </a:pPr>
+            <a:endParaRPr sz="1200">
+              <a:latin typeface="Calibri"/>
+              <a:ea typeface="Calibri"/>
+              <a:cs typeface="Calibri"/>
+              <a:sym typeface="Calibri"/>
+            </a:endParaRPr>
+          </a:p>
+        </p:txBody>
+      </p:sp>
+      <p:sp>
+        <p:nvSpPr>
+          <p:cNvPr id="97" name="Google Shape;97;g167c3300ff1_0_278:notes"/>
+          <p:cNvSpPr>
+            <a:spLocks noGrp="1" noRot="1" noChangeAspect="1"/>
+          </p:cNvSpPr>
+          <p:nvPr>
+            <p:ph type="sldImg" idx="2"/>
+          </p:nvPr>
+        </p:nvSpPr>
+        <p:spPr>
+          <a:xfrm>
+            <a:off x="381000" y="685800"/>
+            <a:ext cx="6096000" cy="3429000"/>
+          </a:xfrm>
+          <a:custGeom>
+            <a:avLst/>
+            <a:gdLst/>
+            <a:ahLst/>
+            <a:cxnLst/>
+            <a:rect l="l" t="t" r="r" b="b"/>
+            <a:pathLst>
+              <a:path w="120000" h="120000" extrusionOk="0">
+                <a:moveTo>
+                  <a:pt x="0" y="0"/>
+                </a:moveTo>
+                <a:lnTo>
+                  <a:pt x="120000" y="0"/>
+                </a:lnTo>
+                <a:lnTo>
+                  <a:pt x="120000" y="120000"/>
+                </a:lnTo>
+                <a:lnTo>
+                  <a:pt x="0" y="120000"/>
+                </a:lnTo>
+                <a:close/>
+              </a:path>
+            </a:pathLst>
+          </a:custGeom>
+          <a:noFill/>
+          <a:ln w="9525" cap="flat" cmpd="sng">
+            <a:solidFill>
+              <a:srgbClr val="000000"/>
+            </a:solidFill>
+            <a:prstDash val="solid"/>
+            <a:round/>
+            <a:headEnd type="none" w="sm" len="sm"/>
+            <a:tailEnd type="none" w="sm" len="sm"/>
+          </a:ln>
+        </p:spPr>
+      </p:sp>
+    </p:spTree>
+    <p:extLst>
+      <p:ext uri="{BB962C8B-B14F-4D97-AF65-F5344CB8AC3E}">
+        <p14:creationId xmlns:p14="http://schemas.microsoft.com/office/powerpoint/2010/main" val="2415905920"/>
       </p:ext>
     </p:extLst>
   </p:cSld>
@@ -10938,6 +12512,2199 @@
 </p:sld>
 </file>
 
+<file path=ppt/slides/slide20.xml><?xml version="1.0" encoding="utf-8"?>
+<p:sld xmlns:a="http://schemas.openxmlformats.org/drawingml/2006/main" xmlns:r="http://schemas.openxmlformats.org/officeDocument/2006/relationships" xmlns:p="http://schemas.openxmlformats.org/presentationml/2006/main">
+  <p:cSld>
+    <p:spTree>
+      <p:nvGrpSpPr>
+        <p:cNvPr id="1" name="Shape 98"/>
+        <p:cNvGrpSpPr/>
+        <p:nvPr/>
+      </p:nvGrpSpPr>
+      <p:grpSpPr>
+        <a:xfrm>
+          <a:off x="0" y="0"/>
+          <a:ext cx="0" cy="0"/>
+          <a:chOff x="0" y="0"/>
+          <a:chExt cx="0" cy="0"/>
+        </a:xfrm>
+      </p:grpSpPr>
+      <p:sp>
+        <p:nvSpPr>
+          <p:cNvPr id="99" name="Google Shape;99;p25"/>
+          <p:cNvSpPr txBox="1"/>
+          <p:nvPr/>
+        </p:nvSpPr>
+        <p:spPr>
+          <a:xfrm>
+            <a:off x="240215" y="3325780"/>
+            <a:ext cx="8663700" cy="184666"/>
+          </a:xfrm>
+          <a:prstGeom prst="rect">
+            <a:avLst/>
+          </a:prstGeom>
+          <a:noFill/>
+          <a:ln>
+            <a:noFill/>
+          </a:ln>
+        </p:spPr>
+        <p:txBody>
+          <a:bodyPr spcFirstLastPara="1" wrap="square" lIns="0" tIns="0" rIns="0" bIns="0" anchor="ctr" anchorCtr="0">
+            <a:spAutoFit/>
+          </a:bodyPr>
+          <a:lstStyle/>
+          <a:p>
+            <a:pPr marL="0" marR="0" lvl="0" indent="0" algn="ctr" rtl="0">
+              <a:lnSpc>
+                <a:spcPct val="100000"/>
+              </a:lnSpc>
+              <a:spcBef>
+                <a:spcPts val="0"/>
+              </a:spcBef>
+              <a:spcAft>
+                <a:spcPts val="0"/>
+              </a:spcAft>
+              <a:buClr>
+                <a:schemeClr val="dk1"/>
+              </a:buClr>
+              <a:buSzPts val="3111"/>
+              <a:buFont typeface="Arial"/>
+              <a:buNone/>
+            </a:pPr>
+            <a:r>
+              <a:rPr lang="en-US" sz="1200" b="1" i="0" u="none" strike="noStrike" cap="none" dirty="0">
+                <a:solidFill>
+                  <a:schemeClr val="dk1"/>
+                </a:solidFill>
+                <a:latin typeface="Montserrat"/>
+                <a:ea typeface="Montserrat"/>
+                <a:cs typeface="Montserrat"/>
+                <a:sym typeface="Montserrat"/>
+              </a:rPr>
+              <a:t>Python for Geospatial Big Data and Data Science Using the FASRC</a:t>
+            </a:r>
+          </a:p>
+        </p:txBody>
+      </p:sp>
+      <p:sp>
+        <p:nvSpPr>
+          <p:cNvPr id="100" name="Google Shape;100;p25"/>
+          <p:cNvSpPr txBox="1"/>
+          <p:nvPr/>
+        </p:nvSpPr>
+        <p:spPr>
+          <a:xfrm>
+            <a:off x="0" y="1616875"/>
+            <a:ext cx="9144000" cy="923299"/>
+          </a:xfrm>
+          <a:prstGeom prst="rect">
+            <a:avLst/>
+          </a:prstGeom>
+          <a:solidFill>
+            <a:srgbClr val="007A87"/>
+          </a:solidFill>
+          <a:ln>
+            <a:noFill/>
+          </a:ln>
+        </p:spPr>
+        <p:txBody>
+          <a:bodyPr spcFirstLastPara="1" wrap="square" lIns="91425" tIns="91425" rIns="91425" bIns="91425" anchor="t" anchorCtr="0">
+            <a:spAutoFit/>
+          </a:bodyPr>
+          <a:lstStyle/>
+          <a:p>
+            <a:pPr marL="0" marR="0" lvl="0" indent="0" algn="ctr" rtl="0">
+              <a:lnSpc>
+                <a:spcPct val="100000"/>
+              </a:lnSpc>
+              <a:spcBef>
+                <a:spcPts val="0"/>
+              </a:spcBef>
+              <a:spcAft>
+                <a:spcPts val="0"/>
+              </a:spcAft>
+              <a:buClr>
+                <a:schemeClr val="dk1"/>
+              </a:buClr>
+              <a:buSzPts val="3111"/>
+              <a:buFont typeface="Arial"/>
+              <a:buNone/>
+            </a:pPr>
+            <a:r>
+              <a:rPr lang="en-US" sz="2400" b="1" dirty="0">
+                <a:solidFill>
+                  <a:schemeClr val="lt1"/>
+                </a:solidFill>
+                <a:latin typeface="Montserrat"/>
+                <a:ea typeface="Montserrat"/>
+                <a:cs typeface="Montserrat"/>
+                <a:sym typeface="Montserrat"/>
+              </a:rPr>
+              <a:t>Chapter 2</a:t>
+            </a:r>
+          </a:p>
+          <a:p>
+            <a:pPr marL="0" marR="0" lvl="0" indent="0" algn="ctr" rtl="0">
+              <a:lnSpc>
+                <a:spcPct val="100000"/>
+              </a:lnSpc>
+              <a:spcBef>
+                <a:spcPts val="0"/>
+              </a:spcBef>
+              <a:spcAft>
+                <a:spcPts val="0"/>
+              </a:spcAft>
+              <a:buClr>
+                <a:schemeClr val="dk1"/>
+              </a:buClr>
+              <a:buSzPts val="3111"/>
+              <a:buFont typeface="Arial"/>
+              <a:buNone/>
+            </a:pPr>
+            <a:r>
+              <a:rPr lang="en-US" sz="2400" b="1" i="0" u="none" strike="noStrike" cap="none" dirty="0">
+                <a:solidFill>
+                  <a:schemeClr val="lt1"/>
+                </a:solidFill>
+                <a:latin typeface="Montserrat"/>
+                <a:ea typeface="Montserrat"/>
+                <a:cs typeface="Montserrat"/>
+                <a:sym typeface="Montserrat"/>
+              </a:rPr>
+              <a:t>Basics of Big Data Software Development</a:t>
+            </a:r>
+            <a:endParaRPr sz="1600" b="1" i="0" u="none" strike="noStrike" cap="none" dirty="0">
+              <a:solidFill>
+                <a:schemeClr val="lt1"/>
+              </a:solidFill>
+              <a:latin typeface="Montserrat"/>
+              <a:ea typeface="Montserrat"/>
+              <a:cs typeface="Montserrat"/>
+              <a:sym typeface="Montserrat"/>
+            </a:endParaRPr>
+          </a:p>
+        </p:txBody>
+      </p:sp>
+      <p:pic>
+        <p:nvPicPr>
+          <p:cNvPr id="101" name="Google Shape;101;p25" descr="Partners | The F(o)und Project"/>
+          <p:cNvPicPr preferRelativeResize="0"/>
+          <p:nvPr/>
+        </p:nvPicPr>
+        <p:blipFill rotWithShape="1">
+          <a:blip r:embed="rId3">
+            <a:alphaModFix/>
+          </a:blip>
+          <a:srcRect/>
+          <a:stretch/>
+        </p:blipFill>
+        <p:spPr>
+          <a:xfrm>
+            <a:off x="3665344" y="4405468"/>
+            <a:ext cx="1764792" cy="617243"/>
+          </a:xfrm>
+          <a:prstGeom prst="rect">
+            <a:avLst/>
+          </a:prstGeom>
+          <a:noFill/>
+          <a:ln>
+            <a:noFill/>
+          </a:ln>
+        </p:spPr>
+      </p:pic>
+    </p:spTree>
+    <p:extLst>
+      <p:ext uri="{BB962C8B-B14F-4D97-AF65-F5344CB8AC3E}">
+        <p14:creationId xmlns:p14="http://schemas.microsoft.com/office/powerpoint/2010/main" val="2136348083"/>
+      </p:ext>
+    </p:extLst>
+  </p:cSld>
+  <p:clrMapOvr>
+    <a:masterClrMapping/>
+  </p:clrMapOvr>
+</p:sld>
+</file>
+
+<file path=ppt/slides/slide21.xml><?xml version="1.0" encoding="utf-8"?>
+<p:sld xmlns:a="http://schemas.openxmlformats.org/drawingml/2006/main" xmlns:r="http://schemas.openxmlformats.org/officeDocument/2006/relationships" xmlns:p="http://schemas.openxmlformats.org/presentationml/2006/main">
+  <p:cSld>
+    <p:spTree>
+      <p:nvGrpSpPr>
+        <p:cNvPr id="1" name="Shape 98"/>
+        <p:cNvGrpSpPr/>
+        <p:nvPr/>
+      </p:nvGrpSpPr>
+      <p:grpSpPr>
+        <a:xfrm>
+          <a:off x="0" y="0"/>
+          <a:ext cx="0" cy="0"/>
+          <a:chOff x="0" y="0"/>
+          <a:chExt cx="0" cy="0"/>
+        </a:xfrm>
+      </p:grpSpPr>
+      <p:sp>
+        <p:nvSpPr>
+          <p:cNvPr id="99" name="Google Shape;99;p25"/>
+          <p:cNvSpPr txBox="1"/>
+          <p:nvPr/>
+        </p:nvSpPr>
+        <p:spPr>
+          <a:xfrm>
+            <a:off x="240215" y="3325780"/>
+            <a:ext cx="8663700" cy="184666"/>
+          </a:xfrm>
+          <a:prstGeom prst="rect">
+            <a:avLst/>
+          </a:prstGeom>
+          <a:noFill/>
+          <a:ln>
+            <a:noFill/>
+          </a:ln>
+        </p:spPr>
+        <p:txBody>
+          <a:bodyPr spcFirstLastPara="1" wrap="square" lIns="0" tIns="0" rIns="0" bIns="0" anchor="ctr" anchorCtr="0">
+            <a:spAutoFit/>
+          </a:bodyPr>
+          <a:lstStyle/>
+          <a:p>
+            <a:pPr marL="0" marR="0" lvl="0" indent="0" algn="ctr" rtl="0">
+              <a:lnSpc>
+                <a:spcPct val="100000"/>
+              </a:lnSpc>
+              <a:spcBef>
+                <a:spcPts val="0"/>
+              </a:spcBef>
+              <a:spcAft>
+                <a:spcPts val="0"/>
+              </a:spcAft>
+              <a:buClr>
+                <a:schemeClr val="dk1"/>
+              </a:buClr>
+              <a:buSzPts val="3111"/>
+              <a:buFont typeface="Arial"/>
+              <a:buNone/>
+            </a:pPr>
+            <a:r>
+              <a:rPr lang="en-US" sz="1200" b="1" i="0" u="none" strike="noStrike" cap="none" dirty="0">
+                <a:solidFill>
+                  <a:schemeClr val="dk1"/>
+                </a:solidFill>
+                <a:latin typeface="Montserrat"/>
+                <a:ea typeface="Montserrat"/>
+                <a:cs typeface="Montserrat"/>
+                <a:sym typeface="Montserrat"/>
+              </a:rPr>
+              <a:t>5min coffee break</a:t>
+            </a:r>
+          </a:p>
+        </p:txBody>
+      </p:sp>
+      <p:sp>
+        <p:nvSpPr>
+          <p:cNvPr id="100" name="Google Shape;100;p25"/>
+          <p:cNvSpPr txBox="1"/>
+          <p:nvPr/>
+        </p:nvSpPr>
+        <p:spPr>
+          <a:xfrm>
+            <a:off x="0" y="1616875"/>
+            <a:ext cx="9144000" cy="923299"/>
+          </a:xfrm>
+          <a:prstGeom prst="rect">
+            <a:avLst/>
+          </a:prstGeom>
+          <a:solidFill>
+            <a:srgbClr val="007A87"/>
+          </a:solidFill>
+          <a:ln>
+            <a:noFill/>
+          </a:ln>
+        </p:spPr>
+        <p:txBody>
+          <a:bodyPr spcFirstLastPara="1" wrap="square" lIns="91425" tIns="91425" rIns="91425" bIns="91425" anchor="t" anchorCtr="0">
+            <a:spAutoFit/>
+          </a:bodyPr>
+          <a:lstStyle/>
+          <a:p>
+            <a:pPr marL="0" marR="0" lvl="0" indent="0" algn="ctr" rtl="0">
+              <a:lnSpc>
+                <a:spcPct val="100000"/>
+              </a:lnSpc>
+              <a:spcBef>
+                <a:spcPts val="0"/>
+              </a:spcBef>
+              <a:spcAft>
+                <a:spcPts val="0"/>
+              </a:spcAft>
+              <a:buClr>
+                <a:schemeClr val="dk1"/>
+              </a:buClr>
+              <a:buSzPts val="3111"/>
+              <a:buFont typeface="Arial"/>
+              <a:buNone/>
+            </a:pPr>
+            <a:r>
+              <a:rPr lang="en-US" sz="2400" b="1" i="0" u="none" strike="noStrike" cap="none" dirty="0">
+                <a:solidFill>
+                  <a:schemeClr val="lt1"/>
+                </a:solidFill>
+                <a:latin typeface="Montserrat"/>
+                <a:ea typeface="Montserrat"/>
+                <a:cs typeface="Montserrat"/>
+                <a:sym typeface="Montserrat"/>
+              </a:rPr>
+              <a:t>Chapter 2</a:t>
+            </a:r>
+          </a:p>
+          <a:p>
+            <a:pPr marL="0" marR="0" lvl="0" indent="0" algn="ctr" rtl="0">
+              <a:lnSpc>
+                <a:spcPct val="100000"/>
+              </a:lnSpc>
+              <a:spcBef>
+                <a:spcPts val="0"/>
+              </a:spcBef>
+              <a:spcAft>
+                <a:spcPts val="0"/>
+              </a:spcAft>
+              <a:buClr>
+                <a:schemeClr val="dk1"/>
+              </a:buClr>
+              <a:buSzPts val="3111"/>
+              <a:buFont typeface="Arial"/>
+              <a:buNone/>
+            </a:pPr>
+            <a:r>
+              <a:rPr lang="en-US" sz="2400" b="1" dirty="0">
+                <a:solidFill>
+                  <a:schemeClr val="lt1"/>
+                </a:solidFill>
+                <a:latin typeface="Montserrat"/>
+                <a:ea typeface="Montserrat"/>
+                <a:cs typeface="Montserrat"/>
+                <a:sym typeface="Montserrat"/>
+              </a:rPr>
+              <a:t>Questions &amp; Comments?</a:t>
+            </a:r>
+            <a:endParaRPr sz="1600" b="1" i="0" u="none" strike="noStrike" cap="none" dirty="0">
+              <a:solidFill>
+                <a:schemeClr val="lt1"/>
+              </a:solidFill>
+              <a:latin typeface="Montserrat"/>
+              <a:ea typeface="Montserrat"/>
+              <a:cs typeface="Montserrat"/>
+              <a:sym typeface="Montserrat"/>
+            </a:endParaRPr>
+          </a:p>
+        </p:txBody>
+      </p:sp>
+      <p:pic>
+        <p:nvPicPr>
+          <p:cNvPr id="101" name="Google Shape;101;p25" descr="Partners | The F(o)und Project"/>
+          <p:cNvPicPr preferRelativeResize="0"/>
+          <p:nvPr/>
+        </p:nvPicPr>
+        <p:blipFill rotWithShape="1">
+          <a:blip r:embed="rId3">
+            <a:alphaModFix/>
+          </a:blip>
+          <a:srcRect/>
+          <a:stretch/>
+        </p:blipFill>
+        <p:spPr>
+          <a:xfrm>
+            <a:off x="3665344" y="4405468"/>
+            <a:ext cx="1764792" cy="617243"/>
+          </a:xfrm>
+          <a:prstGeom prst="rect">
+            <a:avLst/>
+          </a:prstGeom>
+          <a:noFill/>
+          <a:ln>
+            <a:noFill/>
+          </a:ln>
+        </p:spPr>
+      </p:pic>
+    </p:spTree>
+    <p:extLst>
+      <p:ext uri="{BB962C8B-B14F-4D97-AF65-F5344CB8AC3E}">
+        <p14:creationId xmlns:p14="http://schemas.microsoft.com/office/powerpoint/2010/main" val="831235325"/>
+      </p:ext>
+    </p:extLst>
+  </p:cSld>
+  <p:clrMapOvr>
+    <a:masterClrMapping/>
+  </p:clrMapOvr>
+</p:sld>
+</file>
+
+<file path=ppt/slides/slide22.xml><?xml version="1.0" encoding="utf-8"?>
+<p:sld xmlns:a="http://schemas.openxmlformats.org/drawingml/2006/main" xmlns:r="http://schemas.openxmlformats.org/officeDocument/2006/relationships" xmlns:p="http://schemas.openxmlformats.org/presentationml/2006/main">
+  <p:cSld>
+    <p:spTree>
+      <p:nvGrpSpPr>
+        <p:cNvPr id="1" name="Shape 98"/>
+        <p:cNvGrpSpPr/>
+        <p:nvPr/>
+      </p:nvGrpSpPr>
+      <p:grpSpPr>
+        <a:xfrm>
+          <a:off x="0" y="0"/>
+          <a:ext cx="0" cy="0"/>
+          <a:chOff x="0" y="0"/>
+          <a:chExt cx="0" cy="0"/>
+        </a:xfrm>
+      </p:grpSpPr>
+      <p:sp>
+        <p:nvSpPr>
+          <p:cNvPr id="99" name="Google Shape;99;p25"/>
+          <p:cNvSpPr txBox="1"/>
+          <p:nvPr/>
+        </p:nvSpPr>
+        <p:spPr>
+          <a:xfrm>
+            <a:off x="240215" y="3325780"/>
+            <a:ext cx="8663700" cy="184666"/>
+          </a:xfrm>
+          <a:prstGeom prst="rect">
+            <a:avLst/>
+          </a:prstGeom>
+          <a:noFill/>
+          <a:ln>
+            <a:noFill/>
+          </a:ln>
+        </p:spPr>
+        <p:txBody>
+          <a:bodyPr spcFirstLastPara="1" wrap="square" lIns="0" tIns="0" rIns="0" bIns="0" anchor="ctr" anchorCtr="0">
+            <a:spAutoFit/>
+          </a:bodyPr>
+          <a:lstStyle/>
+          <a:p>
+            <a:pPr marL="0" marR="0" lvl="0" indent="0" algn="ctr" rtl="0">
+              <a:lnSpc>
+                <a:spcPct val="100000"/>
+              </a:lnSpc>
+              <a:spcBef>
+                <a:spcPts val="0"/>
+              </a:spcBef>
+              <a:spcAft>
+                <a:spcPts val="0"/>
+              </a:spcAft>
+              <a:buClr>
+                <a:schemeClr val="dk1"/>
+              </a:buClr>
+              <a:buSzPts val="3111"/>
+              <a:buFont typeface="Arial"/>
+              <a:buNone/>
+            </a:pPr>
+            <a:r>
+              <a:rPr lang="en-US" sz="1200" b="1" i="0" u="none" strike="noStrike" cap="none" dirty="0">
+                <a:solidFill>
+                  <a:schemeClr val="dk1"/>
+                </a:solidFill>
+                <a:latin typeface="Montserrat"/>
+                <a:ea typeface="Montserrat"/>
+                <a:cs typeface="Montserrat"/>
+                <a:sym typeface="Montserrat"/>
+              </a:rPr>
+              <a:t>Python for Geospatial Big Data and Data Science Using the FASRC</a:t>
+            </a:r>
+          </a:p>
+        </p:txBody>
+      </p:sp>
+      <p:sp>
+        <p:nvSpPr>
+          <p:cNvPr id="100" name="Google Shape;100;p25"/>
+          <p:cNvSpPr txBox="1"/>
+          <p:nvPr/>
+        </p:nvSpPr>
+        <p:spPr>
+          <a:xfrm>
+            <a:off x="0" y="1616875"/>
+            <a:ext cx="9144000" cy="923299"/>
+          </a:xfrm>
+          <a:prstGeom prst="rect">
+            <a:avLst/>
+          </a:prstGeom>
+          <a:solidFill>
+            <a:srgbClr val="007A87"/>
+          </a:solidFill>
+          <a:ln>
+            <a:noFill/>
+          </a:ln>
+        </p:spPr>
+        <p:txBody>
+          <a:bodyPr spcFirstLastPara="1" wrap="square" lIns="91425" tIns="91425" rIns="91425" bIns="91425" anchor="t" anchorCtr="0">
+            <a:spAutoFit/>
+          </a:bodyPr>
+          <a:lstStyle/>
+          <a:p>
+            <a:pPr marL="0" marR="0" lvl="0" indent="0" algn="ctr" rtl="0">
+              <a:lnSpc>
+                <a:spcPct val="100000"/>
+              </a:lnSpc>
+              <a:spcBef>
+                <a:spcPts val="0"/>
+              </a:spcBef>
+              <a:spcAft>
+                <a:spcPts val="0"/>
+              </a:spcAft>
+              <a:buClr>
+                <a:schemeClr val="dk1"/>
+              </a:buClr>
+              <a:buSzPts val="3111"/>
+              <a:buFont typeface="Arial"/>
+              <a:buNone/>
+            </a:pPr>
+            <a:r>
+              <a:rPr lang="en-US" sz="2400" b="1" dirty="0">
+                <a:solidFill>
+                  <a:schemeClr val="lt1"/>
+                </a:solidFill>
+                <a:latin typeface="Montserrat"/>
+                <a:ea typeface="Montserrat"/>
+                <a:cs typeface="Montserrat"/>
+                <a:sym typeface="Montserrat"/>
+              </a:rPr>
+              <a:t>Chapter 3</a:t>
+            </a:r>
+          </a:p>
+          <a:p>
+            <a:pPr marL="0" marR="0" lvl="0" indent="0" algn="ctr" rtl="0">
+              <a:lnSpc>
+                <a:spcPct val="100000"/>
+              </a:lnSpc>
+              <a:spcBef>
+                <a:spcPts val="0"/>
+              </a:spcBef>
+              <a:spcAft>
+                <a:spcPts val="0"/>
+              </a:spcAft>
+              <a:buClr>
+                <a:schemeClr val="dk1"/>
+              </a:buClr>
+              <a:buSzPts val="3111"/>
+              <a:buFont typeface="Arial"/>
+              <a:buNone/>
+            </a:pPr>
+            <a:r>
+              <a:rPr lang="en-US" sz="2400" b="1" i="0" u="none" strike="noStrike" cap="none" dirty="0">
+                <a:solidFill>
+                  <a:schemeClr val="lt1"/>
+                </a:solidFill>
+                <a:latin typeface="Montserrat"/>
+                <a:ea typeface="Montserrat"/>
+                <a:cs typeface="Montserrat"/>
+                <a:sym typeface="Montserrat"/>
+              </a:rPr>
+              <a:t>Introduction to the Case Study</a:t>
+            </a:r>
+            <a:endParaRPr sz="1600" b="1" i="0" u="none" strike="noStrike" cap="none" dirty="0">
+              <a:solidFill>
+                <a:schemeClr val="lt1"/>
+              </a:solidFill>
+              <a:latin typeface="Montserrat"/>
+              <a:ea typeface="Montserrat"/>
+              <a:cs typeface="Montserrat"/>
+              <a:sym typeface="Montserrat"/>
+            </a:endParaRPr>
+          </a:p>
+        </p:txBody>
+      </p:sp>
+      <p:pic>
+        <p:nvPicPr>
+          <p:cNvPr id="101" name="Google Shape;101;p25" descr="Partners | The F(o)und Project"/>
+          <p:cNvPicPr preferRelativeResize="0"/>
+          <p:nvPr/>
+        </p:nvPicPr>
+        <p:blipFill rotWithShape="1">
+          <a:blip r:embed="rId3">
+            <a:alphaModFix/>
+          </a:blip>
+          <a:srcRect/>
+          <a:stretch/>
+        </p:blipFill>
+        <p:spPr>
+          <a:xfrm>
+            <a:off x="3665344" y="4405468"/>
+            <a:ext cx="1764792" cy="617243"/>
+          </a:xfrm>
+          <a:prstGeom prst="rect">
+            <a:avLst/>
+          </a:prstGeom>
+          <a:noFill/>
+          <a:ln>
+            <a:noFill/>
+          </a:ln>
+        </p:spPr>
+      </p:pic>
+    </p:spTree>
+    <p:extLst>
+      <p:ext uri="{BB962C8B-B14F-4D97-AF65-F5344CB8AC3E}">
+        <p14:creationId xmlns:p14="http://schemas.microsoft.com/office/powerpoint/2010/main" val="3042099366"/>
+      </p:ext>
+    </p:extLst>
+  </p:cSld>
+  <p:clrMapOvr>
+    <a:masterClrMapping/>
+  </p:clrMapOvr>
+</p:sld>
+</file>
+
+<file path=ppt/slides/slide23.xml><?xml version="1.0" encoding="utf-8"?>
+<p:sld xmlns:a="http://schemas.openxmlformats.org/drawingml/2006/main" xmlns:r="http://schemas.openxmlformats.org/officeDocument/2006/relationships" xmlns:p="http://schemas.openxmlformats.org/presentationml/2006/main">
+  <p:cSld>
+    <p:spTree>
+      <p:nvGrpSpPr>
+        <p:cNvPr id="1" name="Shape 98"/>
+        <p:cNvGrpSpPr/>
+        <p:nvPr/>
+      </p:nvGrpSpPr>
+      <p:grpSpPr>
+        <a:xfrm>
+          <a:off x="0" y="0"/>
+          <a:ext cx="0" cy="0"/>
+          <a:chOff x="0" y="0"/>
+          <a:chExt cx="0" cy="0"/>
+        </a:xfrm>
+      </p:grpSpPr>
+      <p:sp>
+        <p:nvSpPr>
+          <p:cNvPr id="99" name="Google Shape;99;p25"/>
+          <p:cNvSpPr txBox="1"/>
+          <p:nvPr/>
+        </p:nvSpPr>
+        <p:spPr>
+          <a:xfrm>
+            <a:off x="240215" y="3325780"/>
+            <a:ext cx="8663700" cy="184666"/>
+          </a:xfrm>
+          <a:prstGeom prst="rect">
+            <a:avLst/>
+          </a:prstGeom>
+          <a:noFill/>
+          <a:ln>
+            <a:noFill/>
+          </a:ln>
+        </p:spPr>
+        <p:txBody>
+          <a:bodyPr spcFirstLastPara="1" wrap="square" lIns="0" tIns="0" rIns="0" bIns="0" anchor="ctr" anchorCtr="0">
+            <a:spAutoFit/>
+          </a:bodyPr>
+          <a:lstStyle/>
+          <a:p>
+            <a:pPr marL="0" marR="0" lvl="0" indent="0" algn="ctr" rtl="0">
+              <a:lnSpc>
+                <a:spcPct val="100000"/>
+              </a:lnSpc>
+              <a:spcBef>
+                <a:spcPts val="0"/>
+              </a:spcBef>
+              <a:spcAft>
+                <a:spcPts val="0"/>
+              </a:spcAft>
+              <a:buClr>
+                <a:schemeClr val="dk1"/>
+              </a:buClr>
+              <a:buSzPts val="3111"/>
+              <a:buFont typeface="Arial"/>
+              <a:buNone/>
+            </a:pPr>
+            <a:r>
+              <a:rPr lang="en-US" sz="1200" b="1" i="0" u="none" strike="noStrike" cap="none" dirty="0">
+                <a:solidFill>
+                  <a:schemeClr val="dk1"/>
+                </a:solidFill>
+                <a:latin typeface="Montserrat"/>
+                <a:ea typeface="Montserrat"/>
+                <a:cs typeface="Montserrat"/>
+                <a:sym typeface="Montserrat"/>
+              </a:rPr>
+              <a:t>1h lunch break</a:t>
+            </a:r>
+          </a:p>
+        </p:txBody>
+      </p:sp>
+      <p:sp>
+        <p:nvSpPr>
+          <p:cNvPr id="100" name="Google Shape;100;p25"/>
+          <p:cNvSpPr txBox="1"/>
+          <p:nvPr/>
+        </p:nvSpPr>
+        <p:spPr>
+          <a:xfrm>
+            <a:off x="0" y="1616875"/>
+            <a:ext cx="9144000" cy="923299"/>
+          </a:xfrm>
+          <a:prstGeom prst="rect">
+            <a:avLst/>
+          </a:prstGeom>
+          <a:solidFill>
+            <a:srgbClr val="007A87"/>
+          </a:solidFill>
+          <a:ln>
+            <a:noFill/>
+          </a:ln>
+        </p:spPr>
+        <p:txBody>
+          <a:bodyPr spcFirstLastPara="1" wrap="square" lIns="91425" tIns="91425" rIns="91425" bIns="91425" anchor="t" anchorCtr="0">
+            <a:spAutoFit/>
+          </a:bodyPr>
+          <a:lstStyle/>
+          <a:p>
+            <a:pPr marL="0" marR="0" lvl="0" indent="0" algn="ctr" rtl="0">
+              <a:lnSpc>
+                <a:spcPct val="100000"/>
+              </a:lnSpc>
+              <a:spcBef>
+                <a:spcPts val="0"/>
+              </a:spcBef>
+              <a:spcAft>
+                <a:spcPts val="0"/>
+              </a:spcAft>
+              <a:buClr>
+                <a:schemeClr val="dk1"/>
+              </a:buClr>
+              <a:buSzPts val="3111"/>
+              <a:buFont typeface="Arial"/>
+              <a:buNone/>
+            </a:pPr>
+            <a:r>
+              <a:rPr lang="en-US" sz="2400" b="1" i="0" u="none" strike="noStrike" cap="none" dirty="0">
+                <a:solidFill>
+                  <a:schemeClr val="lt1"/>
+                </a:solidFill>
+                <a:latin typeface="Montserrat"/>
+                <a:ea typeface="Montserrat"/>
+                <a:cs typeface="Montserrat"/>
+                <a:sym typeface="Montserrat"/>
+              </a:rPr>
+              <a:t>Chapter </a:t>
+            </a:r>
+            <a:r>
+              <a:rPr lang="en-US" sz="2400" b="1" dirty="0">
+                <a:solidFill>
+                  <a:schemeClr val="lt1"/>
+                </a:solidFill>
+                <a:latin typeface="Montserrat"/>
+                <a:ea typeface="Montserrat"/>
+                <a:cs typeface="Montserrat"/>
+                <a:sym typeface="Montserrat"/>
+              </a:rPr>
+              <a:t>3</a:t>
+            </a:r>
+            <a:endParaRPr lang="en-US" sz="2400" b="1" i="0" u="none" strike="noStrike" cap="none" dirty="0">
+              <a:solidFill>
+                <a:schemeClr val="lt1"/>
+              </a:solidFill>
+              <a:latin typeface="Montserrat"/>
+              <a:ea typeface="Montserrat"/>
+              <a:cs typeface="Montserrat"/>
+              <a:sym typeface="Montserrat"/>
+            </a:endParaRPr>
+          </a:p>
+          <a:p>
+            <a:pPr marL="0" marR="0" lvl="0" indent="0" algn="ctr" rtl="0">
+              <a:lnSpc>
+                <a:spcPct val="100000"/>
+              </a:lnSpc>
+              <a:spcBef>
+                <a:spcPts val="0"/>
+              </a:spcBef>
+              <a:spcAft>
+                <a:spcPts val="0"/>
+              </a:spcAft>
+              <a:buClr>
+                <a:schemeClr val="dk1"/>
+              </a:buClr>
+              <a:buSzPts val="3111"/>
+              <a:buFont typeface="Arial"/>
+              <a:buNone/>
+            </a:pPr>
+            <a:r>
+              <a:rPr lang="en-US" sz="2400" b="1" dirty="0">
+                <a:solidFill>
+                  <a:schemeClr val="lt1"/>
+                </a:solidFill>
+                <a:latin typeface="Montserrat"/>
+                <a:ea typeface="Montserrat"/>
+                <a:cs typeface="Montserrat"/>
+                <a:sym typeface="Montserrat"/>
+              </a:rPr>
+              <a:t>Questions &amp; Comments?</a:t>
+            </a:r>
+            <a:endParaRPr sz="1600" b="1" i="0" u="none" strike="noStrike" cap="none" dirty="0">
+              <a:solidFill>
+                <a:schemeClr val="lt1"/>
+              </a:solidFill>
+              <a:latin typeface="Montserrat"/>
+              <a:ea typeface="Montserrat"/>
+              <a:cs typeface="Montserrat"/>
+              <a:sym typeface="Montserrat"/>
+            </a:endParaRPr>
+          </a:p>
+        </p:txBody>
+      </p:sp>
+      <p:pic>
+        <p:nvPicPr>
+          <p:cNvPr id="101" name="Google Shape;101;p25" descr="Partners | The F(o)und Project"/>
+          <p:cNvPicPr preferRelativeResize="0"/>
+          <p:nvPr/>
+        </p:nvPicPr>
+        <p:blipFill rotWithShape="1">
+          <a:blip r:embed="rId3">
+            <a:alphaModFix/>
+          </a:blip>
+          <a:srcRect/>
+          <a:stretch/>
+        </p:blipFill>
+        <p:spPr>
+          <a:xfrm>
+            <a:off x="3665344" y="4405468"/>
+            <a:ext cx="1764792" cy="617243"/>
+          </a:xfrm>
+          <a:prstGeom prst="rect">
+            <a:avLst/>
+          </a:prstGeom>
+          <a:noFill/>
+          <a:ln>
+            <a:noFill/>
+          </a:ln>
+        </p:spPr>
+      </p:pic>
+    </p:spTree>
+    <p:extLst>
+      <p:ext uri="{BB962C8B-B14F-4D97-AF65-F5344CB8AC3E}">
+        <p14:creationId xmlns:p14="http://schemas.microsoft.com/office/powerpoint/2010/main" val="4136898793"/>
+      </p:ext>
+    </p:extLst>
+  </p:cSld>
+  <p:clrMapOvr>
+    <a:masterClrMapping/>
+  </p:clrMapOvr>
+</p:sld>
+</file>
+
+<file path=ppt/slides/slide24.xml><?xml version="1.0" encoding="utf-8"?>
+<p:sld xmlns:a="http://schemas.openxmlformats.org/drawingml/2006/main" xmlns:r="http://schemas.openxmlformats.org/officeDocument/2006/relationships" xmlns:p="http://schemas.openxmlformats.org/presentationml/2006/main">
+  <p:cSld>
+    <p:spTree>
+      <p:nvGrpSpPr>
+        <p:cNvPr id="1" name="Shape 98"/>
+        <p:cNvGrpSpPr/>
+        <p:nvPr/>
+      </p:nvGrpSpPr>
+      <p:grpSpPr>
+        <a:xfrm>
+          <a:off x="0" y="0"/>
+          <a:ext cx="0" cy="0"/>
+          <a:chOff x="0" y="0"/>
+          <a:chExt cx="0" cy="0"/>
+        </a:xfrm>
+      </p:grpSpPr>
+      <p:sp>
+        <p:nvSpPr>
+          <p:cNvPr id="99" name="Google Shape;99;p25"/>
+          <p:cNvSpPr txBox="1"/>
+          <p:nvPr/>
+        </p:nvSpPr>
+        <p:spPr>
+          <a:xfrm>
+            <a:off x="240215" y="3325780"/>
+            <a:ext cx="8663700" cy="184666"/>
+          </a:xfrm>
+          <a:prstGeom prst="rect">
+            <a:avLst/>
+          </a:prstGeom>
+          <a:noFill/>
+          <a:ln>
+            <a:noFill/>
+          </a:ln>
+        </p:spPr>
+        <p:txBody>
+          <a:bodyPr spcFirstLastPara="1" wrap="square" lIns="0" tIns="0" rIns="0" bIns="0" anchor="ctr" anchorCtr="0">
+            <a:spAutoFit/>
+          </a:bodyPr>
+          <a:lstStyle/>
+          <a:p>
+            <a:pPr marL="0" marR="0" lvl="0" indent="0" algn="ctr" rtl="0">
+              <a:lnSpc>
+                <a:spcPct val="100000"/>
+              </a:lnSpc>
+              <a:spcBef>
+                <a:spcPts val="0"/>
+              </a:spcBef>
+              <a:spcAft>
+                <a:spcPts val="0"/>
+              </a:spcAft>
+              <a:buClr>
+                <a:schemeClr val="dk1"/>
+              </a:buClr>
+              <a:buSzPts val="3111"/>
+              <a:buFont typeface="Arial"/>
+              <a:buNone/>
+            </a:pPr>
+            <a:r>
+              <a:rPr lang="en-US" sz="1200" b="1" i="0" u="none" strike="noStrike" cap="none" dirty="0">
+                <a:solidFill>
+                  <a:schemeClr val="dk1"/>
+                </a:solidFill>
+                <a:latin typeface="Montserrat"/>
+                <a:ea typeface="Montserrat"/>
+                <a:cs typeface="Montserrat"/>
+                <a:sym typeface="Montserrat"/>
+              </a:rPr>
+              <a:t>Python for Geospatial Big Data and Data Science Using the FASRC</a:t>
+            </a:r>
+          </a:p>
+        </p:txBody>
+      </p:sp>
+      <p:sp>
+        <p:nvSpPr>
+          <p:cNvPr id="100" name="Google Shape;100;p25"/>
+          <p:cNvSpPr txBox="1"/>
+          <p:nvPr/>
+        </p:nvSpPr>
+        <p:spPr>
+          <a:xfrm>
+            <a:off x="0" y="1616875"/>
+            <a:ext cx="9144000" cy="923299"/>
+          </a:xfrm>
+          <a:prstGeom prst="rect">
+            <a:avLst/>
+          </a:prstGeom>
+          <a:solidFill>
+            <a:srgbClr val="007A87"/>
+          </a:solidFill>
+          <a:ln>
+            <a:noFill/>
+          </a:ln>
+        </p:spPr>
+        <p:txBody>
+          <a:bodyPr spcFirstLastPara="1" wrap="square" lIns="91425" tIns="91425" rIns="91425" bIns="91425" anchor="t" anchorCtr="0">
+            <a:spAutoFit/>
+          </a:bodyPr>
+          <a:lstStyle/>
+          <a:p>
+            <a:pPr marL="0" marR="0" lvl="0" indent="0" algn="ctr" rtl="0">
+              <a:lnSpc>
+                <a:spcPct val="100000"/>
+              </a:lnSpc>
+              <a:spcBef>
+                <a:spcPts val="0"/>
+              </a:spcBef>
+              <a:spcAft>
+                <a:spcPts val="0"/>
+              </a:spcAft>
+              <a:buClr>
+                <a:schemeClr val="dk1"/>
+              </a:buClr>
+              <a:buSzPts val="3111"/>
+              <a:buFont typeface="Arial"/>
+              <a:buNone/>
+            </a:pPr>
+            <a:r>
+              <a:rPr lang="en-US" sz="2400" b="1" dirty="0">
+                <a:solidFill>
+                  <a:schemeClr val="lt1"/>
+                </a:solidFill>
+                <a:latin typeface="Montserrat"/>
+                <a:ea typeface="Montserrat"/>
+                <a:cs typeface="Montserrat"/>
+                <a:sym typeface="Montserrat"/>
+              </a:rPr>
+              <a:t>Chapter 4</a:t>
+            </a:r>
+          </a:p>
+          <a:p>
+            <a:pPr marL="0" marR="0" lvl="0" indent="0" algn="ctr" rtl="0">
+              <a:lnSpc>
+                <a:spcPct val="100000"/>
+              </a:lnSpc>
+              <a:spcBef>
+                <a:spcPts val="0"/>
+              </a:spcBef>
+              <a:spcAft>
+                <a:spcPts val="0"/>
+              </a:spcAft>
+              <a:buClr>
+                <a:schemeClr val="dk1"/>
+              </a:buClr>
+              <a:buSzPts val="3111"/>
+              <a:buFont typeface="Arial"/>
+              <a:buNone/>
+            </a:pPr>
+            <a:r>
+              <a:rPr lang="en-US" sz="2400" b="1" i="0" u="none" strike="noStrike" cap="none" dirty="0">
+                <a:solidFill>
+                  <a:schemeClr val="lt1"/>
+                </a:solidFill>
+                <a:latin typeface="Montserrat"/>
+                <a:ea typeface="Montserrat"/>
+                <a:cs typeface="Montserrat"/>
+                <a:sym typeface="Montserrat"/>
+              </a:rPr>
+              <a:t>Efficient Programming</a:t>
+            </a:r>
+            <a:endParaRPr lang="en-US" sz="1600" b="1" i="0" u="none" strike="noStrike" cap="none" dirty="0">
+              <a:solidFill>
+                <a:schemeClr val="lt1"/>
+              </a:solidFill>
+              <a:latin typeface="Montserrat"/>
+              <a:ea typeface="Montserrat"/>
+              <a:cs typeface="Montserrat"/>
+              <a:sym typeface="Montserrat"/>
+            </a:endParaRPr>
+          </a:p>
+        </p:txBody>
+      </p:sp>
+      <p:pic>
+        <p:nvPicPr>
+          <p:cNvPr id="101" name="Google Shape;101;p25" descr="Partners | The F(o)und Project"/>
+          <p:cNvPicPr preferRelativeResize="0"/>
+          <p:nvPr/>
+        </p:nvPicPr>
+        <p:blipFill rotWithShape="1">
+          <a:blip r:embed="rId3">
+            <a:alphaModFix/>
+          </a:blip>
+          <a:srcRect/>
+          <a:stretch/>
+        </p:blipFill>
+        <p:spPr>
+          <a:xfrm>
+            <a:off x="3665344" y="4405468"/>
+            <a:ext cx="1764792" cy="617243"/>
+          </a:xfrm>
+          <a:prstGeom prst="rect">
+            <a:avLst/>
+          </a:prstGeom>
+          <a:noFill/>
+          <a:ln>
+            <a:noFill/>
+          </a:ln>
+        </p:spPr>
+      </p:pic>
+    </p:spTree>
+    <p:extLst>
+      <p:ext uri="{BB962C8B-B14F-4D97-AF65-F5344CB8AC3E}">
+        <p14:creationId xmlns:p14="http://schemas.microsoft.com/office/powerpoint/2010/main" val="808633761"/>
+      </p:ext>
+    </p:extLst>
+  </p:cSld>
+  <p:clrMapOvr>
+    <a:masterClrMapping/>
+  </p:clrMapOvr>
+</p:sld>
+</file>
+
+<file path=ppt/slides/slide25.xml><?xml version="1.0" encoding="utf-8"?>
+<p:sld xmlns:a="http://schemas.openxmlformats.org/drawingml/2006/main" xmlns:r="http://schemas.openxmlformats.org/officeDocument/2006/relationships" xmlns:p="http://schemas.openxmlformats.org/presentationml/2006/main">
+  <p:cSld>
+    <p:spTree>
+      <p:nvGrpSpPr>
+        <p:cNvPr id="1" name="Shape 98"/>
+        <p:cNvGrpSpPr/>
+        <p:nvPr/>
+      </p:nvGrpSpPr>
+      <p:grpSpPr>
+        <a:xfrm>
+          <a:off x="0" y="0"/>
+          <a:ext cx="0" cy="0"/>
+          <a:chOff x="0" y="0"/>
+          <a:chExt cx="0" cy="0"/>
+        </a:xfrm>
+      </p:grpSpPr>
+      <p:sp>
+        <p:nvSpPr>
+          <p:cNvPr id="99" name="Google Shape;99;p25"/>
+          <p:cNvSpPr txBox="1"/>
+          <p:nvPr/>
+        </p:nvSpPr>
+        <p:spPr>
+          <a:xfrm>
+            <a:off x="240215" y="3325780"/>
+            <a:ext cx="8663700" cy="184666"/>
+          </a:xfrm>
+          <a:prstGeom prst="rect">
+            <a:avLst/>
+          </a:prstGeom>
+          <a:noFill/>
+          <a:ln>
+            <a:noFill/>
+          </a:ln>
+        </p:spPr>
+        <p:txBody>
+          <a:bodyPr spcFirstLastPara="1" wrap="square" lIns="0" tIns="0" rIns="0" bIns="0" anchor="ctr" anchorCtr="0">
+            <a:spAutoFit/>
+          </a:bodyPr>
+          <a:lstStyle/>
+          <a:p>
+            <a:pPr marL="0" marR="0" lvl="0" indent="0" algn="ctr" rtl="0">
+              <a:lnSpc>
+                <a:spcPct val="100000"/>
+              </a:lnSpc>
+              <a:spcBef>
+                <a:spcPts val="0"/>
+              </a:spcBef>
+              <a:spcAft>
+                <a:spcPts val="0"/>
+              </a:spcAft>
+              <a:buClr>
+                <a:schemeClr val="dk1"/>
+              </a:buClr>
+              <a:buSzPts val="3111"/>
+              <a:buFont typeface="Arial"/>
+              <a:buNone/>
+            </a:pPr>
+            <a:r>
+              <a:rPr lang="en-US" sz="1200" b="1" i="0" u="none" strike="noStrike" cap="none" dirty="0">
+                <a:solidFill>
+                  <a:schemeClr val="dk1"/>
+                </a:solidFill>
+                <a:latin typeface="Montserrat"/>
+                <a:ea typeface="Montserrat"/>
+                <a:cs typeface="Montserrat"/>
+                <a:sym typeface="Montserrat"/>
+              </a:rPr>
+              <a:t>5min coffee break</a:t>
+            </a:r>
+          </a:p>
+        </p:txBody>
+      </p:sp>
+      <p:sp>
+        <p:nvSpPr>
+          <p:cNvPr id="100" name="Google Shape;100;p25"/>
+          <p:cNvSpPr txBox="1"/>
+          <p:nvPr/>
+        </p:nvSpPr>
+        <p:spPr>
+          <a:xfrm>
+            <a:off x="0" y="1616875"/>
+            <a:ext cx="9144000" cy="923299"/>
+          </a:xfrm>
+          <a:prstGeom prst="rect">
+            <a:avLst/>
+          </a:prstGeom>
+          <a:solidFill>
+            <a:srgbClr val="007A87"/>
+          </a:solidFill>
+          <a:ln>
+            <a:noFill/>
+          </a:ln>
+        </p:spPr>
+        <p:txBody>
+          <a:bodyPr spcFirstLastPara="1" wrap="square" lIns="91425" tIns="91425" rIns="91425" bIns="91425" anchor="t" anchorCtr="0">
+            <a:spAutoFit/>
+          </a:bodyPr>
+          <a:lstStyle/>
+          <a:p>
+            <a:pPr marL="0" marR="0" lvl="0" indent="0" algn="ctr" rtl="0">
+              <a:lnSpc>
+                <a:spcPct val="100000"/>
+              </a:lnSpc>
+              <a:spcBef>
+                <a:spcPts val="0"/>
+              </a:spcBef>
+              <a:spcAft>
+                <a:spcPts val="0"/>
+              </a:spcAft>
+              <a:buClr>
+                <a:schemeClr val="dk1"/>
+              </a:buClr>
+              <a:buSzPts val="3111"/>
+              <a:buFont typeface="Arial"/>
+              <a:buNone/>
+            </a:pPr>
+            <a:r>
+              <a:rPr lang="en-US" sz="2400" b="1" i="0" u="none" strike="noStrike" cap="none" dirty="0">
+                <a:solidFill>
+                  <a:schemeClr val="lt1"/>
+                </a:solidFill>
+                <a:latin typeface="Montserrat"/>
+                <a:ea typeface="Montserrat"/>
+                <a:cs typeface="Montserrat"/>
+                <a:sym typeface="Montserrat"/>
+              </a:rPr>
+              <a:t>Chapter </a:t>
+            </a:r>
+            <a:r>
+              <a:rPr lang="en-US" sz="2400" b="1" dirty="0">
+                <a:solidFill>
+                  <a:schemeClr val="lt1"/>
+                </a:solidFill>
+                <a:latin typeface="Montserrat"/>
+                <a:ea typeface="Montserrat"/>
+                <a:cs typeface="Montserrat"/>
+                <a:sym typeface="Montserrat"/>
+              </a:rPr>
+              <a:t>4</a:t>
+            </a:r>
+            <a:endParaRPr lang="en-US" sz="2400" b="1" i="0" u="none" strike="noStrike" cap="none" dirty="0">
+              <a:solidFill>
+                <a:schemeClr val="lt1"/>
+              </a:solidFill>
+              <a:latin typeface="Montserrat"/>
+              <a:ea typeface="Montserrat"/>
+              <a:cs typeface="Montserrat"/>
+              <a:sym typeface="Montserrat"/>
+            </a:endParaRPr>
+          </a:p>
+          <a:p>
+            <a:pPr marL="0" marR="0" lvl="0" indent="0" algn="ctr" rtl="0">
+              <a:lnSpc>
+                <a:spcPct val="100000"/>
+              </a:lnSpc>
+              <a:spcBef>
+                <a:spcPts val="0"/>
+              </a:spcBef>
+              <a:spcAft>
+                <a:spcPts val="0"/>
+              </a:spcAft>
+              <a:buClr>
+                <a:schemeClr val="dk1"/>
+              </a:buClr>
+              <a:buSzPts val="3111"/>
+              <a:buFont typeface="Arial"/>
+              <a:buNone/>
+            </a:pPr>
+            <a:r>
+              <a:rPr lang="en-US" sz="2400" b="1" dirty="0">
+                <a:solidFill>
+                  <a:schemeClr val="lt1"/>
+                </a:solidFill>
+                <a:latin typeface="Montserrat"/>
+                <a:ea typeface="Montserrat"/>
+                <a:cs typeface="Montserrat"/>
+                <a:sym typeface="Montserrat"/>
+              </a:rPr>
+              <a:t>Questions &amp; Comments?</a:t>
+            </a:r>
+            <a:endParaRPr sz="1600" b="1" i="0" u="none" strike="noStrike" cap="none" dirty="0">
+              <a:solidFill>
+                <a:schemeClr val="lt1"/>
+              </a:solidFill>
+              <a:latin typeface="Montserrat"/>
+              <a:ea typeface="Montserrat"/>
+              <a:cs typeface="Montserrat"/>
+              <a:sym typeface="Montserrat"/>
+            </a:endParaRPr>
+          </a:p>
+        </p:txBody>
+      </p:sp>
+      <p:pic>
+        <p:nvPicPr>
+          <p:cNvPr id="101" name="Google Shape;101;p25" descr="Partners | The F(o)und Project"/>
+          <p:cNvPicPr preferRelativeResize="0"/>
+          <p:nvPr/>
+        </p:nvPicPr>
+        <p:blipFill rotWithShape="1">
+          <a:blip r:embed="rId3">
+            <a:alphaModFix/>
+          </a:blip>
+          <a:srcRect/>
+          <a:stretch/>
+        </p:blipFill>
+        <p:spPr>
+          <a:xfrm>
+            <a:off x="3665344" y="4405468"/>
+            <a:ext cx="1764792" cy="617243"/>
+          </a:xfrm>
+          <a:prstGeom prst="rect">
+            <a:avLst/>
+          </a:prstGeom>
+          <a:noFill/>
+          <a:ln>
+            <a:noFill/>
+          </a:ln>
+        </p:spPr>
+      </p:pic>
+    </p:spTree>
+    <p:extLst>
+      <p:ext uri="{BB962C8B-B14F-4D97-AF65-F5344CB8AC3E}">
+        <p14:creationId xmlns:p14="http://schemas.microsoft.com/office/powerpoint/2010/main" val="4014332266"/>
+      </p:ext>
+    </p:extLst>
+  </p:cSld>
+  <p:clrMapOvr>
+    <a:masterClrMapping/>
+  </p:clrMapOvr>
+</p:sld>
+</file>
+
+<file path=ppt/slides/slide26.xml><?xml version="1.0" encoding="utf-8"?>
+<p:sld xmlns:a="http://schemas.openxmlformats.org/drawingml/2006/main" xmlns:r="http://schemas.openxmlformats.org/officeDocument/2006/relationships" xmlns:p="http://schemas.openxmlformats.org/presentationml/2006/main">
+  <p:cSld>
+    <p:spTree>
+      <p:nvGrpSpPr>
+        <p:cNvPr id="1" name="Shape 98"/>
+        <p:cNvGrpSpPr/>
+        <p:nvPr/>
+      </p:nvGrpSpPr>
+      <p:grpSpPr>
+        <a:xfrm>
+          <a:off x="0" y="0"/>
+          <a:ext cx="0" cy="0"/>
+          <a:chOff x="0" y="0"/>
+          <a:chExt cx="0" cy="0"/>
+        </a:xfrm>
+      </p:grpSpPr>
+      <p:sp>
+        <p:nvSpPr>
+          <p:cNvPr id="99" name="Google Shape;99;p25"/>
+          <p:cNvSpPr txBox="1"/>
+          <p:nvPr/>
+        </p:nvSpPr>
+        <p:spPr>
+          <a:xfrm>
+            <a:off x="240215" y="3325780"/>
+            <a:ext cx="8663700" cy="184666"/>
+          </a:xfrm>
+          <a:prstGeom prst="rect">
+            <a:avLst/>
+          </a:prstGeom>
+          <a:noFill/>
+          <a:ln>
+            <a:noFill/>
+          </a:ln>
+        </p:spPr>
+        <p:txBody>
+          <a:bodyPr spcFirstLastPara="1" wrap="square" lIns="0" tIns="0" rIns="0" bIns="0" anchor="ctr" anchorCtr="0">
+            <a:spAutoFit/>
+          </a:bodyPr>
+          <a:lstStyle/>
+          <a:p>
+            <a:pPr marL="0" marR="0" lvl="0" indent="0" algn="ctr" rtl="0">
+              <a:lnSpc>
+                <a:spcPct val="100000"/>
+              </a:lnSpc>
+              <a:spcBef>
+                <a:spcPts val="0"/>
+              </a:spcBef>
+              <a:spcAft>
+                <a:spcPts val="0"/>
+              </a:spcAft>
+              <a:buClr>
+                <a:schemeClr val="dk1"/>
+              </a:buClr>
+              <a:buSzPts val="3111"/>
+              <a:buFont typeface="Arial"/>
+              <a:buNone/>
+            </a:pPr>
+            <a:r>
+              <a:rPr lang="en-US" sz="1200" b="1" i="0" u="none" strike="noStrike" cap="none" dirty="0">
+                <a:solidFill>
+                  <a:schemeClr val="dk1"/>
+                </a:solidFill>
+                <a:latin typeface="Montserrat"/>
+                <a:ea typeface="Montserrat"/>
+                <a:cs typeface="Montserrat"/>
+                <a:sym typeface="Montserrat"/>
+              </a:rPr>
+              <a:t>Python for Geospatial Big Data and Data Science Using the FASRC</a:t>
+            </a:r>
+          </a:p>
+        </p:txBody>
+      </p:sp>
+      <p:sp>
+        <p:nvSpPr>
+          <p:cNvPr id="100" name="Google Shape;100;p25"/>
+          <p:cNvSpPr txBox="1"/>
+          <p:nvPr/>
+        </p:nvSpPr>
+        <p:spPr>
+          <a:xfrm>
+            <a:off x="0" y="1616875"/>
+            <a:ext cx="9144000" cy="923299"/>
+          </a:xfrm>
+          <a:prstGeom prst="rect">
+            <a:avLst/>
+          </a:prstGeom>
+          <a:solidFill>
+            <a:srgbClr val="007A87"/>
+          </a:solidFill>
+          <a:ln>
+            <a:noFill/>
+          </a:ln>
+        </p:spPr>
+        <p:txBody>
+          <a:bodyPr spcFirstLastPara="1" wrap="square" lIns="91425" tIns="91425" rIns="91425" bIns="91425" anchor="t" anchorCtr="0">
+            <a:spAutoFit/>
+          </a:bodyPr>
+          <a:lstStyle/>
+          <a:p>
+            <a:pPr marL="0" marR="0" lvl="0" indent="0" algn="ctr" rtl="0">
+              <a:lnSpc>
+                <a:spcPct val="100000"/>
+              </a:lnSpc>
+              <a:spcBef>
+                <a:spcPts val="0"/>
+              </a:spcBef>
+              <a:spcAft>
+                <a:spcPts val="0"/>
+              </a:spcAft>
+              <a:buClr>
+                <a:schemeClr val="dk1"/>
+              </a:buClr>
+              <a:buSzPts val="3111"/>
+              <a:buFont typeface="Arial"/>
+              <a:buNone/>
+            </a:pPr>
+            <a:r>
+              <a:rPr lang="en-US" sz="2400" b="1" dirty="0">
+                <a:solidFill>
+                  <a:schemeClr val="lt1"/>
+                </a:solidFill>
+                <a:latin typeface="Montserrat"/>
+                <a:ea typeface="Montserrat"/>
+                <a:cs typeface="Montserrat"/>
+                <a:sym typeface="Montserrat"/>
+              </a:rPr>
+              <a:t>Chapter 5</a:t>
+            </a:r>
+          </a:p>
+          <a:p>
+            <a:pPr marL="0" marR="0" lvl="0" indent="0" algn="ctr" rtl="0">
+              <a:lnSpc>
+                <a:spcPct val="100000"/>
+              </a:lnSpc>
+              <a:spcBef>
+                <a:spcPts val="0"/>
+              </a:spcBef>
+              <a:spcAft>
+                <a:spcPts val="0"/>
+              </a:spcAft>
+              <a:buClr>
+                <a:schemeClr val="dk1"/>
+              </a:buClr>
+              <a:buSzPts val="3111"/>
+              <a:buFont typeface="Arial"/>
+              <a:buNone/>
+            </a:pPr>
+            <a:r>
+              <a:rPr lang="en-US" sz="2400" b="1" i="0" u="none" strike="noStrike" cap="none" dirty="0">
+                <a:solidFill>
+                  <a:schemeClr val="lt1"/>
+                </a:solidFill>
+                <a:latin typeface="Montserrat"/>
+                <a:ea typeface="Montserrat"/>
+                <a:cs typeface="Montserrat"/>
+                <a:sym typeface="Montserrat"/>
+              </a:rPr>
+              <a:t>Moving to the FASRC</a:t>
+            </a:r>
+            <a:endParaRPr lang="en-US" sz="1600" b="1" i="0" u="none" strike="noStrike" cap="none" dirty="0">
+              <a:solidFill>
+                <a:schemeClr val="lt1"/>
+              </a:solidFill>
+              <a:latin typeface="Montserrat"/>
+              <a:ea typeface="Montserrat"/>
+              <a:cs typeface="Montserrat"/>
+              <a:sym typeface="Montserrat"/>
+            </a:endParaRPr>
+          </a:p>
+        </p:txBody>
+      </p:sp>
+      <p:pic>
+        <p:nvPicPr>
+          <p:cNvPr id="101" name="Google Shape;101;p25" descr="Partners | The F(o)und Project"/>
+          <p:cNvPicPr preferRelativeResize="0"/>
+          <p:nvPr/>
+        </p:nvPicPr>
+        <p:blipFill rotWithShape="1">
+          <a:blip r:embed="rId3">
+            <a:alphaModFix/>
+          </a:blip>
+          <a:srcRect/>
+          <a:stretch/>
+        </p:blipFill>
+        <p:spPr>
+          <a:xfrm>
+            <a:off x="3665344" y="4405468"/>
+            <a:ext cx="1764792" cy="617243"/>
+          </a:xfrm>
+          <a:prstGeom prst="rect">
+            <a:avLst/>
+          </a:prstGeom>
+          <a:noFill/>
+          <a:ln>
+            <a:noFill/>
+          </a:ln>
+        </p:spPr>
+      </p:pic>
+    </p:spTree>
+    <p:extLst>
+      <p:ext uri="{BB962C8B-B14F-4D97-AF65-F5344CB8AC3E}">
+        <p14:creationId xmlns:p14="http://schemas.microsoft.com/office/powerpoint/2010/main" val="2356606823"/>
+      </p:ext>
+    </p:extLst>
+  </p:cSld>
+  <p:clrMapOvr>
+    <a:masterClrMapping/>
+  </p:clrMapOvr>
+</p:sld>
+</file>
+
+<file path=ppt/slides/slide27.xml><?xml version="1.0" encoding="utf-8"?>
+<p:sld xmlns:a="http://schemas.openxmlformats.org/drawingml/2006/main" xmlns:r="http://schemas.openxmlformats.org/officeDocument/2006/relationships" xmlns:p="http://schemas.openxmlformats.org/presentationml/2006/main">
+  <p:cSld>
+    <p:spTree>
+      <p:nvGrpSpPr>
+        <p:cNvPr id="1" name="Shape 98"/>
+        <p:cNvGrpSpPr/>
+        <p:nvPr/>
+      </p:nvGrpSpPr>
+      <p:grpSpPr>
+        <a:xfrm>
+          <a:off x="0" y="0"/>
+          <a:ext cx="0" cy="0"/>
+          <a:chOff x="0" y="0"/>
+          <a:chExt cx="0" cy="0"/>
+        </a:xfrm>
+      </p:grpSpPr>
+      <p:sp>
+        <p:nvSpPr>
+          <p:cNvPr id="99" name="Google Shape;99;p25"/>
+          <p:cNvSpPr txBox="1"/>
+          <p:nvPr/>
+        </p:nvSpPr>
+        <p:spPr>
+          <a:xfrm>
+            <a:off x="240215" y="3325780"/>
+            <a:ext cx="8663700" cy="184666"/>
+          </a:xfrm>
+          <a:prstGeom prst="rect">
+            <a:avLst/>
+          </a:prstGeom>
+          <a:noFill/>
+          <a:ln>
+            <a:noFill/>
+          </a:ln>
+        </p:spPr>
+        <p:txBody>
+          <a:bodyPr spcFirstLastPara="1" wrap="square" lIns="0" tIns="0" rIns="0" bIns="0" anchor="ctr" anchorCtr="0">
+            <a:spAutoFit/>
+          </a:bodyPr>
+          <a:lstStyle/>
+          <a:p>
+            <a:pPr marL="0" marR="0" lvl="0" indent="0" algn="ctr" rtl="0">
+              <a:lnSpc>
+                <a:spcPct val="100000"/>
+              </a:lnSpc>
+              <a:spcBef>
+                <a:spcPts val="0"/>
+              </a:spcBef>
+              <a:spcAft>
+                <a:spcPts val="0"/>
+              </a:spcAft>
+              <a:buClr>
+                <a:schemeClr val="dk1"/>
+              </a:buClr>
+              <a:buSzPts val="3111"/>
+              <a:buFont typeface="Arial"/>
+              <a:buNone/>
+            </a:pPr>
+            <a:r>
+              <a:rPr lang="en-US" sz="1200" b="1" i="0" u="none" strike="noStrike" cap="none" dirty="0">
+                <a:solidFill>
+                  <a:schemeClr val="dk1"/>
+                </a:solidFill>
+                <a:latin typeface="Montserrat"/>
+                <a:ea typeface="Montserrat"/>
+                <a:cs typeface="Montserrat"/>
+                <a:sym typeface="Montserrat"/>
+              </a:rPr>
+              <a:t>5min coffee break</a:t>
+            </a:r>
+          </a:p>
+        </p:txBody>
+      </p:sp>
+      <p:sp>
+        <p:nvSpPr>
+          <p:cNvPr id="100" name="Google Shape;100;p25"/>
+          <p:cNvSpPr txBox="1"/>
+          <p:nvPr/>
+        </p:nvSpPr>
+        <p:spPr>
+          <a:xfrm>
+            <a:off x="0" y="1616875"/>
+            <a:ext cx="9144000" cy="923299"/>
+          </a:xfrm>
+          <a:prstGeom prst="rect">
+            <a:avLst/>
+          </a:prstGeom>
+          <a:solidFill>
+            <a:srgbClr val="007A87"/>
+          </a:solidFill>
+          <a:ln>
+            <a:noFill/>
+          </a:ln>
+        </p:spPr>
+        <p:txBody>
+          <a:bodyPr spcFirstLastPara="1" wrap="square" lIns="91425" tIns="91425" rIns="91425" bIns="91425" anchor="t" anchorCtr="0">
+            <a:spAutoFit/>
+          </a:bodyPr>
+          <a:lstStyle/>
+          <a:p>
+            <a:pPr marL="0" marR="0" lvl="0" indent="0" algn="ctr" rtl="0">
+              <a:lnSpc>
+                <a:spcPct val="100000"/>
+              </a:lnSpc>
+              <a:spcBef>
+                <a:spcPts val="0"/>
+              </a:spcBef>
+              <a:spcAft>
+                <a:spcPts val="0"/>
+              </a:spcAft>
+              <a:buClr>
+                <a:schemeClr val="dk1"/>
+              </a:buClr>
+              <a:buSzPts val="3111"/>
+              <a:buFont typeface="Arial"/>
+              <a:buNone/>
+            </a:pPr>
+            <a:r>
+              <a:rPr lang="en-US" sz="2400" b="1" i="0" u="none" strike="noStrike" cap="none" dirty="0">
+                <a:solidFill>
+                  <a:schemeClr val="lt1"/>
+                </a:solidFill>
+                <a:latin typeface="Montserrat"/>
+                <a:ea typeface="Montserrat"/>
+                <a:cs typeface="Montserrat"/>
+                <a:sym typeface="Montserrat"/>
+              </a:rPr>
+              <a:t>Chapter </a:t>
+            </a:r>
+            <a:r>
+              <a:rPr lang="en-US" sz="2400" b="1" dirty="0">
+                <a:solidFill>
+                  <a:schemeClr val="lt1"/>
+                </a:solidFill>
+                <a:latin typeface="Montserrat"/>
+                <a:ea typeface="Montserrat"/>
+                <a:cs typeface="Montserrat"/>
+                <a:sym typeface="Montserrat"/>
+              </a:rPr>
+              <a:t>5</a:t>
+            </a:r>
+            <a:endParaRPr lang="en-US" sz="2400" b="1" i="0" u="none" strike="noStrike" cap="none" dirty="0">
+              <a:solidFill>
+                <a:schemeClr val="lt1"/>
+              </a:solidFill>
+              <a:latin typeface="Montserrat"/>
+              <a:ea typeface="Montserrat"/>
+              <a:cs typeface="Montserrat"/>
+              <a:sym typeface="Montserrat"/>
+            </a:endParaRPr>
+          </a:p>
+          <a:p>
+            <a:pPr marL="0" marR="0" lvl="0" indent="0" algn="ctr" rtl="0">
+              <a:lnSpc>
+                <a:spcPct val="100000"/>
+              </a:lnSpc>
+              <a:spcBef>
+                <a:spcPts val="0"/>
+              </a:spcBef>
+              <a:spcAft>
+                <a:spcPts val="0"/>
+              </a:spcAft>
+              <a:buClr>
+                <a:schemeClr val="dk1"/>
+              </a:buClr>
+              <a:buSzPts val="3111"/>
+              <a:buFont typeface="Arial"/>
+              <a:buNone/>
+            </a:pPr>
+            <a:r>
+              <a:rPr lang="en-US" sz="2400" b="1" dirty="0">
+                <a:solidFill>
+                  <a:schemeClr val="lt1"/>
+                </a:solidFill>
+                <a:latin typeface="Montserrat"/>
+                <a:ea typeface="Montserrat"/>
+                <a:cs typeface="Montserrat"/>
+                <a:sym typeface="Montserrat"/>
+              </a:rPr>
+              <a:t>Questions &amp; Comments?</a:t>
+            </a:r>
+            <a:endParaRPr sz="1600" b="1" i="0" u="none" strike="noStrike" cap="none" dirty="0">
+              <a:solidFill>
+                <a:schemeClr val="lt1"/>
+              </a:solidFill>
+              <a:latin typeface="Montserrat"/>
+              <a:ea typeface="Montserrat"/>
+              <a:cs typeface="Montserrat"/>
+              <a:sym typeface="Montserrat"/>
+            </a:endParaRPr>
+          </a:p>
+        </p:txBody>
+      </p:sp>
+      <p:pic>
+        <p:nvPicPr>
+          <p:cNvPr id="101" name="Google Shape;101;p25" descr="Partners | The F(o)und Project"/>
+          <p:cNvPicPr preferRelativeResize="0"/>
+          <p:nvPr/>
+        </p:nvPicPr>
+        <p:blipFill rotWithShape="1">
+          <a:blip r:embed="rId3">
+            <a:alphaModFix/>
+          </a:blip>
+          <a:srcRect/>
+          <a:stretch/>
+        </p:blipFill>
+        <p:spPr>
+          <a:xfrm>
+            <a:off x="3665344" y="4405468"/>
+            <a:ext cx="1764792" cy="617243"/>
+          </a:xfrm>
+          <a:prstGeom prst="rect">
+            <a:avLst/>
+          </a:prstGeom>
+          <a:noFill/>
+          <a:ln>
+            <a:noFill/>
+          </a:ln>
+        </p:spPr>
+      </p:pic>
+    </p:spTree>
+    <p:extLst>
+      <p:ext uri="{BB962C8B-B14F-4D97-AF65-F5344CB8AC3E}">
+        <p14:creationId xmlns:p14="http://schemas.microsoft.com/office/powerpoint/2010/main" val="2100662541"/>
+      </p:ext>
+    </p:extLst>
+  </p:cSld>
+  <p:clrMapOvr>
+    <a:masterClrMapping/>
+  </p:clrMapOvr>
+</p:sld>
+</file>
+
+<file path=ppt/slides/slide28.xml><?xml version="1.0" encoding="utf-8"?>
+<p:sld xmlns:a="http://schemas.openxmlformats.org/drawingml/2006/main" xmlns:r="http://schemas.openxmlformats.org/officeDocument/2006/relationships" xmlns:p="http://schemas.openxmlformats.org/presentationml/2006/main">
+  <p:cSld>
+    <p:spTree>
+      <p:nvGrpSpPr>
+        <p:cNvPr id="1" name="Shape 98"/>
+        <p:cNvGrpSpPr/>
+        <p:nvPr/>
+      </p:nvGrpSpPr>
+      <p:grpSpPr>
+        <a:xfrm>
+          <a:off x="0" y="0"/>
+          <a:ext cx="0" cy="0"/>
+          <a:chOff x="0" y="0"/>
+          <a:chExt cx="0" cy="0"/>
+        </a:xfrm>
+      </p:grpSpPr>
+      <p:sp>
+        <p:nvSpPr>
+          <p:cNvPr id="99" name="Google Shape;99;p25"/>
+          <p:cNvSpPr txBox="1"/>
+          <p:nvPr/>
+        </p:nvSpPr>
+        <p:spPr>
+          <a:xfrm>
+            <a:off x="240215" y="3325780"/>
+            <a:ext cx="8663700" cy="184666"/>
+          </a:xfrm>
+          <a:prstGeom prst="rect">
+            <a:avLst/>
+          </a:prstGeom>
+          <a:noFill/>
+          <a:ln>
+            <a:noFill/>
+          </a:ln>
+        </p:spPr>
+        <p:txBody>
+          <a:bodyPr spcFirstLastPara="1" wrap="square" lIns="0" tIns="0" rIns="0" bIns="0" anchor="ctr" anchorCtr="0">
+            <a:spAutoFit/>
+          </a:bodyPr>
+          <a:lstStyle/>
+          <a:p>
+            <a:pPr marL="0" marR="0" lvl="0" indent="0" algn="ctr" rtl="0">
+              <a:lnSpc>
+                <a:spcPct val="100000"/>
+              </a:lnSpc>
+              <a:spcBef>
+                <a:spcPts val="0"/>
+              </a:spcBef>
+              <a:spcAft>
+                <a:spcPts val="0"/>
+              </a:spcAft>
+              <a:buClr>
+                <a:schemeClr val="dk1"/>
+              </a:buClr>
+              <a:buSzPts val="3111"/>
+              <a:buFont typeface="Arial"/>
+              <a:buNone/>
+            </a:pPr>
+            <a:r>
+              <a:rPr lang="en-US" sz="1200" b="1" i="0" u="none" strike="noStrike" cap="none" dirty="0">
+                <a:solidFill>
+                  <a:schemeClr val="dk1"/>
+                </a:solidFill>
+                <a:latin typeface="Montserrat"/>
+                <a:ea typeface="Montserrat"/>
+                <a:cs typeface="Montserrat"/>
+                <a:sym typeface="Montserrat"/>
+              </a:rPr>
+              <a:t>Python for Geospatial Big Data and Data Science Using the FASRC</a:t>
+            </a:r>
+          </a:p>
+        </p:txBody>
+      </p:sp>
+      <p:sp>
+        <p:nvSpPr>
+          <p:cNvPr id="100" name="Google Shape;100;p25"/>
+          <p:cNvSpPr txBox="1"/>
+          <p:nvPr/>
+        </p:nvSpPr>
+        <p:spPr>
+          <a:xfrm>
+            <a:off x="0" y="1616875"/>
+            <a:ext cx="9144000" cy="923299"/>
+          </a:xfrm>
+          <a:prstGeom prst="rect">
+            <a:avLst/>
+          </a:prstGeom>
+          <a:solidFill>
+            <a:srgbClr val="007A87"/>
+          </a:solidFill>
+          <a:ln>
+            <a:noFill/>
+          </a:ln>
+        </p:spPr>
+        <p:txBody>
+          <a:bodyPr spcFirstLastPara="1" wrap="square" lIns="91425" tIns="91425" rIns="91425" bIns="91425" anchor="t" anchorCtr="0">
+            <a:spAutoFit/>
+          </a:bodyPr>
+          <a:lstStyle/>
+          <a:p>
+            <a:pPr marL="0" marR="0" lvl="0" indent="0" algn="ctr" rtl="0">
+              <a:lnSpc>
+                <a:spcPct val="100000"/>
+              </a:lnSpc>
+              <a:spcBef>
+                <a:spcPts val="0"/>
+              </a:spcBef>
+              <a:spcAft>
+                <a:spcPts val="0"/>
+              </a:spcAft>
+              <a:buClr>
+                <a:schemeClr val="dk1"/>
+              </a:buClr>
+              <a:buSzPts val="3111"/>
+              <a:buFont typeface="Arial"/>
+              <a:buNone/>
+            </a:pPr>
+            <a:r>
+              <a:rPr lang="en-US" sz="2400" b="1" dirty="0">
+                <a:solidFill>
+                  <a:schemeClr val="lt1"/>
+                </a:solidFill>
+                <a:latin typeface="Montserrat"/>
+                <a:ea typeface="Montserrat"/>
+                <a:cs typeface="Montserrat"/>
+                <a:sym typeface="Montserrat"/>
+              </a:rPr>
+              <a:t>Chapter 6</a:t>
+            </a:r>
+          </a:p>
+          <a:p>
+            <a:pPr marL="0" marR="0" lvl="0" indent="0" algn="ctr" rtl="0">
+              <a:lnSpc>
+                <a:spcPct val="100000"/>
+              </a:lnSpc>
+              <a:spcBef>
+                <a:spcPts val="0"/>
+              </a:spcBef>
+              <a:spcAft>
+                <a:spcPts val="0"/>
+              </a:spcAft>
+              <a:buClr>
+                <a:schemeClr val="dk1"/>
+              </a:buClr>
+              <a:buSzPts val="3111"/>
+              <a:buFont typeface="Arial"/>
+              <a:buNone/>
+            </a:pPr>
+            <a:r>
+              <a:rPr lang="en-US" sz="2400" b="1" i="0" u="none" strike="noStrike" cap="none" dirty="0">
+                <a:solidFill>
+                  <a:schemeClr val="lt1"/>
+                </a:solidFill>
+                <a:latin typeface="Montserrat"/>
+                <a:ea typeface="Montserrat"/>
+                <a:cs typeface="Montserrat"/>
+                <a:sym typeface="Montserrat"/>
+              </a:rPr>
+              <a:t>Recap, Wrap-up &amp; Outro</a:t>
+            </a:r>
+            <a:endParaRPr sz="1600" b="1" i="0" u="none" strike="noStrike" cap="none" dirty="0">
+              <a:solidFill>
+                <a:schemeClr val="lt1"/>
+              </a:solidFill>
+              <a:latin typeface="Montserrat"/>
+              <a:ea typeface="Montserrat"/>
+              <a:cs typeface="Montserrat"/>
+              <a:sym typeface="Montserrat"/>
+            </a:endParaRPr>
+          </a:p>
+        </p:txBody>
+      </p:sp>
+      <p:pic>
+        <p:nvPicPr>
+          <p:cNvPr id="101" name="Google Shape;101;p25" descr="Partners | The F(o)und Project"/>
+          <p:cNvPicPr preferRelativeResize="0"/>
+          <p:nvPr/>
+        </p:nvPicPr>
+        <p:blipFill rotWithShape="1">
+          <a:blip r:embed="rId3">
+            <a:alphaModFix/>
+          </a:blip>
+          <a:srcRect/>
+          <a:stretch/>
+        </p:blipFill>
+        <p:spPr>
+          <a:xfrm>
+            <a:off x="3665344" y="4405468"/>
+            <a:ext cx="1764792" cy="617243"/>
+          </a:xfrm>
+          <a:prstGeom prst="rect">
+            <a:avLst/>
+          </a:prstGeom>
+          <a:noFill/>
+          <a:ln>
+            <a:noFill/>
+          </a:ln>
+        </p:spPr>
+      </p:pic>
+    </p:spTree>
+    <p:extLst>
+      <p:ext uri="{BB962C8B-B14F-4D97-AF65-F5344CB8AC3E}">
+        <p14:creationId xmlns:p14="http://schemas.microsoft.com/office/powerpoint/2010/main" val="1539258924"/>
+      </p:ext>
+    </p:extLst>
+  </p:cSld>
+  <p:clrMapOvr>
+    <a:masterClrMapping/>
+  </p:clrMapOvr>
+</p:sld>
+</file>
+
+<file path=ppt/slides/slide29.xml><?xml version="1.0" encoding="utf-8"?>
+<p:sld xmlns:a="http://schemas.openxmlformats.org/drawingml/2006/main" xmlns:r="http://schemas.openxmlformats.org/officeDocument/2006/relationships" xmlns:p="http://schemas.openxmlformats.org/presentationml/2006/main">
+  <p:cSld>
+    <p:spTree>
+      <p:nvGrpSpPr>
+        <p:cNvPr id="1" name="Shape 98"/>
+        <p:cNvGrpSpPr/>
+        <p:nvPr/>
+      </p:nvGrpSpPr>
+      <p:grpSpPr>
+        <a:xfrm>
+          <a:off x="0" y="0"/>
+          <a:ext cx="0" cy="0"/>
+          <a:chOff x="0" y="0"/>
+          <a:chExt cx="0" cy="0"/>
+        </a:xfrm>
+      </p:grpSpPr>
+      <p:sp>
+        <p:nvSpPr>
+          <p:cNvPr id="99" name="Google Shape;99;p25"/>
+          <p:cNvSpPr txBox="1"/>
+          <p:nvPr/>
+        </p:nvSpPr>
+        <p:spPr>
+          <a:xfrm>
+            <a:off x="240215" y="3325780"/>
+            <a:ext cx="8663700" cy="184666"/>
+          </a:xfrm>
+          <a:prstGeom prst="rect">
+            <a:avLst/>
+          </a:prstGeom>
+          <a:noFill/>
+          <a:ln>
+            <a:noFill/>
+          </a:ln>
+        </p:spPr>
+        <p:txBody>
+          <a:bodyPr spcFirstLastPara="1" wrap="square" lIns="0" tIns="0" rIns="0" bIns="0" anchor="ctr" anchorCtr="0">
+            <a:spAutoFit/>
+          </a:bodyPr>
+          <a:lstStyle/>
+          <a:p>
+            <a:pPr marL="0" marR="0" lvl="0" indent="0" algn="ctr" rtl="0">
+              <a:lnSpc>
+                <a:spcPct val="100000"/>
+              </a:lnSpc>
+              <a:spcBef>
+                <a:spcPts val="0"/>
+              </a:spcBef>
+              <a:spcAft>
+                <a:spcPts val="0"/>
+              </a:spcAft>
+              <a:buClr>
+                <a:schemeClr val="dk1"/>
+              </a:buClr>
+              <a:buSzPts val="3111"/>
+              <a:buFont typeface="Arial"/>
+              <a:buNone/>
+            </a:pPr>
+            <a:r>
+              <a:rPr lang="en-US" sz="1200" b="1" i="0" u="none" strike="noStrike" cap="none" dirty="0">
+                <a:solidFill>
+                  <a:schemeClr val="dk1"/>
+                </a:solidFill>
+                <a:latin typeface="Montserrat"/>
+                <a:ea typeface="Montserrat"/>
+                <a:cs typeface="Montserrat"/>
+                <a:sym typeface="Montserrat"/>
+              </a:rPr>
+              <a:t>Thank you for joining us!</a:t>
+            </a:r>
+          </a:p>
+        </p:txBody>
+      </p:sp>
+      <p:sp>
+        <p:nvSpPr>
+          <p:cNvPr id="100" name="Google Shape;100;p25"/>
+          <p:cNvSpPr txBox="1"/>
+          <p:nvPr/>
+        </p:nvSpPr>
+        <p:spPr>
+          <a:xfrm>
+            <a:off x="0" y="1616875"/>
+            <a:ext cx="9144000" cy="923299"/>
+          </a:xfrm>
+          <a:prstGeom prst="rect">
+            <a:avLst/>
+          </a:prstGeom>
+          <a:solidFill>
+            <a:srgbClr val="007A87"/>
+          </a:solidFill>
+          <a:ln>
+            <a:noFill/>
+          </a:ln>
+        </p:spPr>
+        <p:txBody>
+          <a:bodyPr spcFirstLastPara="1" wrap="square" lIns="91425" tIns="91425" rIns="91425" bIns="91425" anchor="t" anchorCtr="0">
+            <a:spAutoFit/>
+          </a:bodyPr>
+          <a:lstStyle/>
+          <a:p>
+            <a:pPr marL="0" marR="0" lvl="0" indent="0" algn="ctr" rtl="0">
+              <a:lnSpc>
+                <a:spcPct val="100000"/>
+              </a:lnSpc>
+              <a:spcBef>
+                <a:spcPts val="0"/>
+              </a:spcBef>
+              <a:spcAft>
+                <a:spcPts val="0"/>
+              </a:spcAft>
+              <a:buClr>
+                <a:schemeClr val="dk1"/>
+              </a:buClr>
+              <a:buSzPts val="3111"/>
+              <a:buFont typeface="Arial"/>
+              <a:buNone/>
+            </a:pPr>
+            <a:r>
+              <a:rPr lang="en-US" sz="2400" b="1" i="0" u="none" strike="noStrike" cap="none" dirty="0">
+                <a:solidFill>
+                  <a:schemeClr val="lt1"/>
+                </a:solidFill>
+                <a:latin typeface="Montserrat"/>
+                <a:ea typeface="Montserrat"/>
+                <a:cs typeface="Montserrat"/>
+                <a:sym typeface="Montserrat"/>
+              </a:rPr>
+              <a:t>Chapter 6</a:t>
+            </a:r>
+          </a:p>
+          <a:p>
+            <a:pPr marL="0" marR="0" lvl="0" indent="0" algn="ctr" rtl="0">
+              <a:lnSpc>
+                <a:spcPct val="100000"/>
+              </a:lnSpc>
+              <a:spcBef>
+                <a:spcPts val="0"/>
+              </a:spcBef>
+              <a:spcAft>
+                <a:spcPts val="0"/>
+              </a:spcAft>
+              <a:buClr>
+                <a:schemeClr val="dk1"/>
+              </a:buClr>
+              <a:buSzPts val="3111"/>
+              <a:buFont typeface="Arial"/>
+              <a:buNone/>
+            </a:pPr>
+            <a:r>
+              <a:rPr lang="en-US" sz="2400" b="1" dirty="0">
+                <a:solidFill>
+                  <a:schemeClr val="lt1"/>
+                </a:solidFill>
+                <a:latin typeface="Montserrat"/>
+                <a:ea typeface="Montserrat"/>
+                <a:cs typeface="Montserrat"/>
+                <a:sym typeface="Montserrat"/>
+              </a:rPr>
+              <a:t>Questions &amp; Comments?</a:t>
+            </a:r>
+            <a:endParaRPr sz="1600" b="1" i="0" u="none" strike="noStrike" cap="none" dirty="0">
+              <a:solidFill>
+                <a:schemeClr val="lt1"/>
+              </a:solidFill>
+              <a:latin typeface="Montserrat"/>
+              <a:ea typeface="Montserrat"/>
+              <a:cs typeface="Montserrat"/>
+              <a:sym typeface="Montserrat"/>
+            </a:endParaRPr>
+          </a:p>
+        </p:txBody>
+      </p:sp>
+      <p:pic>
+        <p:nvPicPr>
+          <p:cNvPr id="101" name="Google Shape;101;p25" descr="Partners | The F(o)und Project"/>
+          <p:cNvPicPr preferRelativeResize="0"/>
+          <p:nvPr/>
+        </p:nvPicPr>
+        <p:blipFill rotWithShape="1">
+          <a:blip r:embed="rId3">
+            <a:alphaModFix/>
+          </a:blip>
+          <a:srcRect/>
+          <a:stretch/>
+        </p:blipFill>
+        <p:spPr>
+          <a:xfrm>
+            <a:off x="3665344" y="4405468"/>
+            <a:ext cx="1764792" cy="617243"/>
+          </a:xfrm>
+          <a:prstGeom prst="rect">
+            <a:avLst/>
+          </a:prstGeom>
+          <a:noFill/>
+          <a:ln>
+            <a:noFill/>
+          </a:ln>
+        </p:spPr>
+      </p:pic>
+    </p:spTree>
+    <p:extLst>
+      <p:ext uri="{BB962C8B-B14F-4D97-AF65-F5344CB8AC3E}">
+        <p14:creationId xmlns:p14="http://schemas.microsoft.com/office/powerpoint/2010/main" val="2330798503"/>
+      </p:ext>
+    </p:extLst>
+  </p:cSld>
+  <p:clrMapOvr>
+    <a:masterClrMapping/>
+  </p:clrMapOvr>
+</p:sld>
+</file>
+
 <file path=ppt/slides/slide3.xml><?xml version="1.0" encoding="utf-8"?>
 <p:sld xmlns:a="http://schemas.openxmlformats.org/drawingml/2006/main" xmlns:r="http://schemas.openxmlformats.org/officeDocument/2006/relationships" xmlns:p="http://schemas.openxmlformats.org/presentationml/2006/main">
   <p:cSld>

</xml_diff>